<commit_message>
when 'isreseted'-> login block, when pwchg->unlock
</commit_message>
<xml_diff>
--- a/documents/자재관리시스템_보안점검 결과서.pptx
+++ b/documents/자재관리시스템_보안점검 결과서.pptx
@@ -247,7 +247,7 @@
               <a:pPr>
                 <a:defRPr/>
               </a:pPr>
-              <a:t>2017-01-10</a:t>
+              <a:t>2017-03-06</a:t>
             </a:fld>
             <a:endParaRPr lang="ko-KR" altLang="en-US"/>
           </a:p>
@@ -6209,14 +6209,14 @@
           <p:nvPr>
             <p:extLst>
               <p:ext uri="{D42A27DB-BD31-4B8C-83A1-F6EECF244321}">
-                <p14:modId xmlns:p14="http://schemas.microsoft.com/office/powerpoint/2010/main" val="3252184757"/>
+                <p14:modId xmlns:p14="http://schemas.microsoft.com/office/powerpoint/2010/main" val="158547075"/>
               </p:ext>
             </p:extLst>
           </p:nvPr>
         </p:nvGraphicFramePr>
         <p:xfrm>
           <a:off x="238125" y="642938"/>
-          <a:ext cx="9429750" cy="5621334"/>
+          <a:ext cx="9429750" cy="5760409"/>
         </p:xfrm>
         <a:graphic>
           <a:graphicData uri="http://schemas.openxmlformats.org/drawingml/2006/table">
@@ -6422,7 +6422,7 @@
                         <a:tabLst/>
                       </a:pPr>
                       <a:r>
-                        <a:rPr kumimoji="0" lang="ko-KR" altLang="en-US" sz="1100" b="1" i="0" u="none" strike="noStrike" cap="none" normalizeH="0" baseline="0" smtClean="0">
+                        <a:rPr kumimoji="0" lang="ko-KR" altLang="en-US" sz="1100" b="1" i="0" u="none" strike="noStrike" cap="none" normalizeH="0" baseline="0" dirty="0" smtClean="0">
                           <a:ln>
                             <a:noFill/>
                           </a:ln>
@@ -6507,7 +6507,7 @@
                         <a:tabLst/>
                       </a:pPr>
                       <a:r>
-                        <a:rPr kumimoji="0" lang="ko-KR" altLang="en-US" sz="1100" b="1" i="0" u="none" strike="noStrike" cap="none" normalizeH="0" baseline="0" smtClean="0">
+                        <a:rPr kumimoji="0" lang="ko-KR" altLang="en-US" sz="1100" b="1" i="0" u="none" strike="noStrike" cap="none" normalizeH="0" baseline="0" dirty="0" smtClean="0">
                           <a:ln>
                             <a:noFill/>
                           </a:ln>
@@ -6520,7 +6520,7 @@
                         </a:rPr>
                         <a:t>적용여부</a:t>
                       </a:r>
-                      <a:endParaRPr kumimoji="0" lang="en-US" altLang="ko-KR" sz="1100" b="1" i="0" u="none" strike="noStrike" cap="none" normalizeH="0" baseline="0" smtClean="0">
+                      <a:endParaRPr kumimoji="0" lang="en-US" altLang="ko-KR" sz="1100" b="1" i="0" u="none" strike="noStrike" cap="none" normalizeH="0" baseline="0" dirty="0" smtClean="0">
                         <a:ln>
                           <a:noFill/>
                         </a:ln>
@@ -6550,7 +6550,7 @@
                         <a:tabLst/>
                       </a:pPr>
                       <a:r>
-                        <a:rPr kumimoji="0" lang="en-US" altLang="ko-KR" sz="1100" b="1" i="0" u="none" strike="noStrike" cap="none" normalizeH="0" baseline="0" smtClean="0">
+                        <a:rPr kumimoji="0" lang="en-US" altLang="ko-KR" sz="1100" b="1" i="0" u="none" strike="noStrike" cap="none" normalizeH="0" baseline="0" dirty="0" smtClean="0">
                           <a:ln>
                             <a:noFill/>
                           </a:ln>
@@ -6563,7 +6563,7 @@
                         </a:rPr>
                         <a:t>(O/X)</a:t>
                       </a:r>
-                      <a:endParaRPr kumimoji="0" lang="ko-KR" altLang="en-US" sz="1100" b="1" i="0" u="none" strike="noStrike" cap="none" normalizeH="0" baseline="0" smtClean="0">
+                      <a:endParaRPr kumimoji="0" lang="ko-KR" altLang="en-US" sz="1100" b="1" i="0" u="none" strike="noStrike" cap="none" normalizeH="0" baseline="0" dirty="0" smtClean="0">
                         <a:ln>
                           <a:noFill/>
                         </a:ln>
@@ -6710,7 +6710,7 @@
                   </a:tcPr>
                 </a:tc>
               </a:tr>
-              <a:tr h="325471">
+              <a:tr h="464546">
                 <a:tc rowSpan="3">
                   <a:txBody>
                     <a:bodyPr/>
@@ -6818,7 +6818,7 @@
                         <a:tabLst/>
                       </a:pPr>
                       <a:r>
-                        <a:rPr kumimoji="0" lang="ko-KR" altLang="en-US" sz="1100" b="0" i="0" u="none" strike="noStrike" cap="none" normalizeH="0" baseline="0" smtClean="0">
+                        <a:rPr kumimoji="0" lang="ko-KR" altLang="en-US" sz="1100" b="0" i="0" u="none" strike="noStrike" cap="none" normalizeH="0" baseline="0" dirty="0" smtClean="0">
                           <a:ln>
                             <a:noFill/>
                           </a:ln>
@@ -6832,7 +6832,7 @@
                         <a:t>유일한 </a:t>
                       </a:r>
                       <a:r>
-                        <a:rPr kumimoji="0" lang="en-US" altLang="ko-KR" sz="1100" b="0" i="0" u="none" strike="noStrike" cap="none" normalizeH="0" baseline="0" smtClean="0">
+                        <a:rPr kumimoji="0" lang="en-US" altLang="ko-KR" sz="1100" b="0" i="0" u="none" strike="noStrike" cap="none" normalizeH="0" baseline="0" dirty="0" smtClean="0">
                           <a:ln>
                             <a:noFill/>
                           </a:ln>
@@ -6846,7 +6846,7 @@
                         <a:t>ID </a:t>
                       </a:r>
                       <a:r>
-                        <a:rPr kumimoji="0" lang="ko-KR" altLang="en-US" sz="1100" b="0" i="0" u="none" strike="noStrike" cap="none" normalizeH="0" baseline="0" smtClean="0">
+                        <a:rPr kumimoji="0" lang="ko-KR" altLang="en-US" sz="1100" b="0" i="0" u="none" strike="noStrike" cap="none" normalizeH="0" baseline="0" dirty="0" smtClean="0">
                           <a:ln>
                             <a:noFill/>
                           </a:ln>
@@ -6859,7 +6859,7 @@
                         </a:rPr>
                         <a:t>사용</a:t>
                       </a:r>
-                      <a:endParaRPr kumimoji="0" lang="en-US" altLang="ko-KR" sz="1100" b="0" i="0" u="none" strike="noStrike" cap="none" normalizeH="0" baseline="0" smtClean="0">
+                      <a:endParaRPr kumimoji="0" lang="en-US" altLang="ko-KR" sz="1100" b="0" i="0" u="none" strike="noStrike" cap="none" normalizeH="0" baseline="0" dirty="0" smtClean="0">
                         <a:ln>
                           <a:noFill/>
                         </a:ln>
@@ -6940,7 +6940,7 @@
                         <a:tabLst/>
                       </a:pPr>
                       <a:r>
-                        <a:rPr kumimoji="0" lang="ko-KR" altLang="ko-KR" sz="1100" b="0" i="0" u="none" strike="noStrike" cap="none" normalizeH="0" baseline="0" smtClean="0">
+                        <a:rPr kumimoji="0" lang="ko-KR" altLang="ko-KR" sz="1100" b="0" i="0" u="none" strike="noStrike" cap="none" normalizeH="0" baseline="0" dirty="0" smtClean="0">
                           <a:ln>
                             <a:noFill/>
                           </a:ln>
@@ -6954,7 +6954,7 @@
                         <a:t>모든 사용자 </a:t>
                       </a:r>
                       <a:r>
-                        <a:rPr kumimoji="0" lang="en-US" altLang="ko-KR" sz="1100" b="0" i="0" u="none" strike="noStrike" cap="none" normalizeH="0" baseline="0" smtClean="0">
+                        <a:rPr kumimoji="0" lang="en-US" altLang="ko-KR" sz="1100" b="0" i="0" u="none" strike="noStrike" cap="none" normalizeH="0" baseline="0" dirty="0" smtClean="0">
                           <a:ln>
                             <a:noFill/>
                           </a:ln>
@@ -6968,7 +6968,7 @@
                         <a:t>ID</a:t>
                       </a:r>
                       <a:r>
-                        <a:rPr kumimoji="0" lang="ko-KR" altLang="en-US" sz="1100" b="0" i="0" u="none" strike="noStrike" cap="none" normalizeH="0" baseline="0" smtClean="0">
+                        <a:rPr kumimoji="0" lang="ko-KR" altLang="en-US" sz="1100" b="0" i="0" u="none" strike="noStrike" cap="none" normalizeH="0" baseline="0" dirty="0" smtClean="0">
                           <a:ln>
                             <a:noFill/>
                           </a:ln>
@@ -6982,7 +6982,7 @@
                         <a:t>는</a:t>
                       </a:r>
                       <a:r>
-                        <a:rPr kumimoji="0" lang="ko-KR" altLang="ko-KR" sz="1100" b="0" i="0" u="none" strike="noStrike" cap="none" normalizeH="0" baseline="0" smtClean="0">
+                        <a:rPr kumimoji="0" lang="ko-KR" altLang="ko-KR" sz="1100" b="0" i="0" u="none" strike="noStrike" cap="none" normalizeH="0" baseline="0" dirty="0" smtClean="0">
                           <a:ln>
                             <a:noFill/>
                           </a:ln>
@@ -6996,7 +6996,7 @@
                         <a:t> 중복되지 않도록 사용자마다 유일</a:t>
                       </a:r>
                       <a:r>
-                        <a:rPr kumimoji="0" lang="ko-KR" altLang="en-US" sz="1100" b="0" i="0" u="none" strike="noStrike" cap="none" normalizeH="0" baseline="0" smtClean="0">
+                        <a:rPr kumimoji="0" lang="ko-KR" altLang="en-US" sz="1100" b="0" i="0" u="none" strike="noStrike" cap="none" normalizeH="0" baseline="0" dirty="0" smtClean="0">
                           <a:ln>
                             <a:noFill/>
                           </a:ln>
@@ -7009,7 +7009,7 @@
                         </a:rPr>
                         <a:t>해야 함</a:t>
                       </a:r>
-                      <a:endParaRPr kumimoji="0" lang="ko-KR" altLang="ko-KR" sz="1100" b="0" i="0" u="none" strike="noStrike" cap="none" normalizeH="0" baseline="0" smtClean="0">
+                      <a:endParaRPr kumimoji="0" lang="ko-KR" altLang="ko-KR" sz="1100" b="0" i="0" u="none" strike="noStrike" cap="none" normalizeH="0" baseline="0" dirty="0" smtClean="0">
                         <a:ln>
                           <a:noFill/>
                         </a:ln>
@@ -7090,7 +7090,7 @@
                         <a:tabLst/>
                       </a:pPr>
                       <a:r>
-                        <a:rPr kumimoji="0" lang="en-US" altLang="ko-KR" sz="1100" b="0" i="0" u="none" strike="noStrike" cap="none" normalizeH="0" baseline="0" smtClean="0">
+                        <a:rPr kumimoji="0" lang="en-US" altLang="ko-KR" sz="1100" b="0" i="0" u="none" strike="noStrike" cap="none" normalizeH="0" baseline="0" dirty="0" smtClean="0">
                           <a:ln>
                             <a:noFill/>
                           </a:ln>
@@ -7202,18 +7202,6 @@
                         </a:rPr>
                         <a:t> 검증</a:t>
                       </a:r>
-                      <a:endParaRPr kumimoji="0" lang="ko-KR" altLang="en-US" sz="1100" b="1" i="0" u="none" strike="noStrike" kern="1200" cap="none" normalizeH="0" baseline="0" dirty="0" smtClean="0">
-                        <a:ln>
-                          <a:noFill/>
-                        </a:ln>
-                        <a:solidFill>
-                          <a:schemeClr val="tx1"/>
-                        </a:solidFill>
-                        <a:effectLst/>
-                        <a:latin typeface="Arial" pitchFamily="34" charset="0"/>
-                        <a:ea typeface="돋움" pitchFamily="50" charset="-127"/>
-                        <a:cs typeface="+mn-cs"/>
-                      </a:endParaRPr>
                     </a:p>
                   </a:txBody>
                   <a:tcPr marL="91439" marR="91439" marT="45725" marB="45725" anchor="ctr" horzOverflow="overflow">
@@ -7419,7 +7407,7 @@
                         <a:tabLst/>
                       </a:pPr>
                       <a:r>
-                        <a:rPr kumimoji="0" lang="ko-KR" altLang="en-US" sz="1100" b="0" i="0" u="none" strike="noStrike" cap="none" normalizeH="0" baseline="0" smtClean="0">
+                        <a:rPr kumimoji="0" lang="ko-KR" altLang="en-US" sz="1100" b="0" i="0" u="none" strike="noStrike" cap="none" normalizeH="0" baseline="0" dirty="0" smtClean="0">
                           <a:ln>
                             <a:noFill/>
                           </a:ln>
@@ -7433,7 +7421,7 @@
                         <a:t>일정기간</a:t>
                       </a:r>
                       <a:r>
-                        <a:rPr kumimoji="0" lang="en-US" altLang="ko-KR" sz="1100" b="0" i="0" u="none" strike="noStrike" cap="none" normalizeH="0" baseline="0" smtClean="0">
+                        <a:rPr kumimoji="0" lang="en-US" altLang="ko-KR" sz="1100" b="0" i="0" u="none" strike="noStrike" cap="none" normalizeH="0" baseline="0" dirty="0" smtClean="0">
                           <a:ln>
                             <a:noFill/>
                           </a:ln>
@@ -7447,7 +7435,7 @@
                         <a:t>(3</a:t>
                       </a:r>
                       <a:r>
-                        <a:rPr kumimoji="0" lang="ko-KR" altLang="en-US" sz="1100" b="0" i="0" u="none" strike="noStrike" cap="none" normalizeH="0" baseline="0" smtClean="0">
+                        <a:rPr kumimoji="0" lang="ko-KR" altLang="en-US" sz="1100" b="0" i="0" u="none" strike="noStrike" cap="none" normalizeH="0" baseline="0" dirty="0" smtClean="0">
                           <a:ln>
                             <a:noFill/>
                           </a:ln>
@@ -7461,7 +7449,7 @@
                         <a:t>개월 이상</a:t>
                       </a:r>
                       <a:r>
-                        <a:rPr kumimoji="0" lang="en-US" altLang="ko-KR" sz="1100" b="0" i="0" u="none" strike="noStrike" cap="none" normalizeH="0" baseline="0" smtClean="0">
+                        <a:rPr kumimoji="0" lang="en-US" altLang="ko-KR" sz="1100" b="0" i="0" u="none" strike="noStrike" cap="none" normalizeH="0" baseline="0" dirty="0" smtClean="0">
                           <a:ln>
                             <a:noFill/>
                           </a:ln>
@@ -7475,7 +7463,7 @@
                         <a:t>)</a:t>
                       </a:r>
                       <a:r>
-                        <a:rPr kumimoji="0" lang="ko-KR" altLang="en-US" sz="1100" b="0" i="0" u="none" strike="noStrike" cap="none" normalizeH="0" baseline="0" smtClean="0">
+                        <a:rPr kumimoji="0" lang="ko-KR" altLang="en-US" sz="1100" b="0" i="0" u="none" strike="noStrike" cap="none" normalizeH="0" baseline="0" dirty="0" smtClean="0">
                           <a:ln>
                             <a:noFill/>
                           </a:ln>
@@ -7489,7 +7477,7 @@
                         <a:t> 사용하지 않은 계정을 </a:t>
                       </a:r>
                       <a:r>
-                        <a:rPr kumimoji="0" lang="en-US" altLang="ko-KR" sz="1100" b="0" i="0" u="none" strike="noStrike" cap="none" normalizeH="0" baseline="0" smtClean="0">
+                        <a:rPr kumimoji="0" lang="en-US" altLang="ko-KR" sz="1100" b="0" i="0" u="none" strike="noStrike" cap="none" normalizeH="0" baseline="0" dirty="0" smtClean="0">
                           <a:ln>
                             <a:noFill/>
                           </a:ln>
@@ -7503,7 +7491,7 @@
                         <a:t>Lock </a:t>
                       </a:r>
                       <a:r>
-                        <a:rPr kumimoji="0" lang="ko-KR" altLang="en-US" sz="1100" b="0" i="0" u="none" strike="noStrike" cap="none" normalizeH="0" baseline="0" smtClean="0">
+                        <a:rPr kumimoji="0" lang="ko-KR" altLang="en-US" sz="1100" b="0" i="0" u="none" strike="noStrike" cap="none" normalizeH="0" baseline="0" dirty="0" smtClean="0">
                           <a:ln>
                             <a:noFill/>
                           </a:ln>
@@ -7516,7 +7504,7 @@
                         </a:rPr>
                         <a:t>시키는 기능</a:t>
                       </a:r>
-                      <a:endParaRPr kumimoji="0" lang="en-US" altLang="ko-KR" sz="1100" b="0" i="0" u="none" strike="noStrike" cap="none" normalizeH="0" baseline="0" smtClean="0">
+                      <a:endParaRPr kumimoji="0" lang="en-US" altLang="ko-KR" sz="1100" b="0" i="0" u="none" strike="noStrike" cap="none" normalizeH="0" baseline="0" dirty="0" smtClean="0">
                         <a:ln>
                           <a:noFill/>
                         </a:ln>
@@ -7597,7 +7585,7 @@
                         <a:tabLst/>
                       </a:pPr>
                       <a:r>
-                        <a:rPr kumimoji="0" lang="en-US" altLang="ko-KR" sz="1100" b="0" i="0" u="none" strike="noStrike" cap="none" normalizeH="0" baseline="0" dirty="0" smtClean="0">
+                        <a:rPr kumimoji="0" lang="en-US" altLang="ko-KR" sz="1100" b="0" i="0" u="none" strike="noStrike" cap="none" normalizeH="0" baseline="0" smtClean="0">
                           <a:ln>
                             <a:noFill/>
                           </a:ln>
@@ -7608,7 +7596,7 @@
                           <a:latin typeface="Arial" pitchFamily="34" charset="0"/>
                           <a:ea typeface="돋움" pitchFamily="50" charset="-127"/>
                         </a:rPr>
-                        <a:t>N/A</a:t>
+                        <a:t>O</a:t>
                       </a:r>
                       <a:endParaRPr kumimoji="0" lang="ko-KR" altLang="en-US" sz="1100" b="0" i="0" u="none" strike="noStrike" cap="none" normalizeH="0" baseline="0" dirty="0" smtClean="0">
                         <a:ln>
@@ -7720,18 +7708,6 @@
                         </a:rPr>
                         <a:t> 관리자권한으로 통제가능</a:t>
                       </a:r>
-                      <a:endParaRPr kumimoji="0" lang="ko-KR" altLang="en-US" sz="1100" b="1" i="0" u="none" strike="noStrike" kern="1200" cap="none" normalizeH="0" baseline="0" dirty="0" smtClean="0">
-                        <a:ln>
-                          <a:noFill/>
-                        </a:ln>
-                        <a:solidFill>
-                          <a:schemeClr val="tx1"/>
-                        </a:solidFill>
-                        <a:effectLst/>
-                        <a:latin typeface="Arial" pitchFamily="34" charset="0"/>
-                        <a:ea typeface="돋움" pitchFamily="50" charset="-127"/>
-                        <a:cs typeface="+mn-cs"/>
-                      </a:endParaRPr>
                     </a:p>
                   </a:txBody>
                   <a:tcPr marL="36000" marR="91439" marT="45725" marB="45725" anchor="ctr" horzOverflow="overflow">
@@ -7909,7 +7885,7 @@
                         <a:tabLst/>
                       </a:pPr>
                       <a:r>
-                        <a:rPr kumimoji="0" lang="ko-KR" altLang="en-US" sz="1100" b="0" i="0" u="none" strike="noStrike" cap="none" normalizeH="0" baseline="0" smtClean="0">
+                        <a:rPr kumimoji="0" lang="ko-KR" altLang="en-US" sz="1100" b="0" i="0" u="none" strike="noStrike" cap="none" normalizeH="0" baseline="0" dirty="0" smtClean="0">
                           <a:ln>
                             <a:noFill/>
                           </a:ln>
@@ -7923,7 +7899,7 @@
                         <a:t>일정시간</a:t>
                       </a:r>
                       <a:r>
-                        <a:rPr kumimoji="0" lang="en-US" altLang="ko-KR" sz="1100" b="0" i="0" u="none" strike="noStrike" cap="none" normalizeH="0" baseline="0" smtClean="0">
+                        <a:rPr kumimoji="0" lang="en-US" altLang="ko-KR" sz="1100" b="0" i="0" u="none" strike="noStrike" cap="none" normalizeH="0" baseline="0" dirty="0" smtClean="0">
                           <a:ln>
                             <a:noFill/>
                           </a:ln>
@@ -7937,7 +7913,7 @@
                         <a:t>(30</a:t>
                       </a:r>
                       <a:r>
-                        <a:rPr kumimoji="0" lang="ko-KR" altLang="en-US" sz="1100" b="0" i="0" u="none" strike="noStrike" cap="none" normalizeH="0" baseline="0" smtClean="0">
+                        <a:rPr kumimoji="0" lang="ko-KR" altLang="en-US" sz="1100" b="0" i="0" u="none" strike="noStrike" cap="none" normalizeH="0" baseline="0" dirty="0" smtClean="0">
                           <a:ln>
                             <a:noFill/>
                           </a:ln>
@@ -7951,7 +7927,7 @@
                         <a:t>분</a:t>
                       </a:r>
                       <a:r>
-                        <a:rPr kumimoji="0" lang="en-US" altLang="ko-KR" sz="1100" b="0" i="0" u="none" strike="noStrike" cap="none" normalizeH="0" baseline="0" smtClean="0">
+                        <a:rPr kumimoji="0" lang="en-US" altLang="ko-KR" sz="1100" b="0" i="0" u="none" strike="noStrike" cap="none" normalizeH="0" baseline="0" dirty="0" smtClean="0">
                           <a:ln>
                             <a:noFill/>
                           </a:ln>
@@ -7965,7 +7941,7 @@
                         <a:t>~1</a:t>
                       </a:r>
                       <a:r>
-                        <a:rPr kumimoji="0" lang="ko-KR" altLang="en-US" sz="1100" b="0" i="0" u="none" strike="noStrike" cap="none" normalizeH="0" baseline="0" smtClean="0">
+                        <a:rPr kumimoji="0" lang="ko-KR" altLang="en-US" sz="1100" b="0" i="0" u="none" strike="noStrike" cap="none" normalizeH="0" baseline="0" dirty="0" smtClean="0">
                           <a:ln>
                             <a:noFill/>
                           </a:ln>
@@ -7979,7 +7955,7 @@
                         <a:t>시간</a:t>
                       </a:r>
                       <a:r>
-                        <a:rPr kumimoji="0" lang="en-US" altLang="ko-KR" sz="1100" b="0" i="0" u="none" strike="noStrike" cap="none" normalizeH="0" baseline="0" smtClean="0">
+                        <a:rPr kumimoji="0" lang="en-US" altLang="ko-KR" sz="1100" b="0" i="0" u="none" strike="noStrike" cap="none" normalizeH="0" baseline="0" dirty="0" smtClean="0">
                           <a:ln>
                             <a:noFill/>
                           </a:ln>
@@ -7993,7 +7969,7 @@
                         <a:t>)</a:t>
                       </a:r>
                       <a:r>
-                        <a:rPr kumimoji="0" lang="ko-KR" altLang="en-US" sz="1100" b="0" i="0" u="none" strike="noStrike" cap="none" normalizeH="0" baseline="0" smtClean="0">
+                        <a:rPr kumimoji="0" lang="ko-KR" altLang="en-US" sz="1100" b="0" i="0" u="none" strike="noStrike" cap="none" normalizeH="0" baseline="0" dirty="0" smtClean="0">
                           <a:ln>
                             <a:noFill/>
                           </a:ln>
@@ -8007,7 +7983,7 @@
                         <a:t>동안 키 입력이 없는 경우 해당 계정을 강제 로그아웃</a:t>
                       </a:r>
                       <a:r>
-                        <a:rPr kumimoji="0" lang="en-US" altLang="ko-KR" sz="1100" b="0" i="0" u="none" strike="noStrike" cap="none" normalizeH="0" baseline="0" smtClean="0">
+                        <a:rPr kumimoji="0" lang="en-US" altLang="ko-KR" sz="1100" b="0" i="0" u="none" strike="noStrike" cap="none" normalizeH="0" baseline="0" dirty="0" smtClean="0">
                           <a:ln>
                             <a:noFill/>
                           </a:ln>
@@ -8021,7 +7997,7 @@
                         <a:t>(</a:t>
                       </a:r>
                       <a:r>
-                        <a:rPr kumimoji="0" lang="ko-KR" altLang="en-US" sz="1100" b="0" i="0" u="none" strike="noStrike" cap="none" normalizeH="0" baseline="0" smtClean="0">
+                        <a:rPr kumimoji="0" lang="ko-KR" altLang="en-US" sz="1100" b="0" i="0" u="none" strike="noStrike" cap="none" normalizeH="0" baseline="0" dirty="0" smtClean="0">
                           <a:ln>
                             <a:noFill/>
                           </a:ln>
@@ -8035,7 +8011,7 @@
                         <a:t>또는 세션차단</a:t>
                       </a:r>
                       <a:r>
-                        <a:rPr kumimoji="0" lang="en-US" altLang="ko-KR" sz="1100" b="0" i="0" u="none" strike="noStrike" cap="none" normalizeH="0" baseline="0" smtClean="0">
+                        <a:rPr kumimoji="0" lang="en-US" altLang="ko-KR" sz="1100" b="0" i="0" u="none" strike="noStrike" cap="none" normalizeH="0" baseline="0" dirty="0" smtClean="0">
                           <a:ln>
                             <a:noFill/>
                           </a:ln>
@@ -8049,7 +8025,7 @@
                         <a:t>)</a:t>
                       </a:r>
                       <a:r>
-                        <a:rPr kumimoji="0" lang="ko-KR" altLang="en-US" sz="1100" b="0" i="0" u="none" strike="noStrike" cap="none" normalizeH="0" baseline="0" smtClean="0">
+                        <a:rPr kumimoji="0" lang="ko-KR" altLang="en-US" sz="1100" b="0" i="0" u="none" strike="noStrike" cap="none" normalizeH="0" baseline="0" dirty="0" smtClean="0">
                           <a:ln>
                             <a:noFill/>
                           </a:ln>
@@ -8062,7 +8038,7 @@
                         </a:rPr>
                         <a:t>    시키는 기능</a:t>
                       </a:r>
-                      <a:endParaRPr kumimoji="0" lang="en-US" altLang="ko-KR" sz="1100" b="0" i="0" u="none" strike="noStrike" cap="none" normalizeH="0" baseline="0" smtClean="0">
+                      <a:endParaRPr kumimoji="0" lang="en-US" altLang="ko-KR" sz="1100" b="0" i="0" u="none" strike="noStrike" cap="none" normalizeH="0" baseline="0" dirty="0" smtClean="0">
                         <a:ln>
                           <a:noFill/>
                         </a:ln>
@@ -8540,7 +8516,7 @@
                         <a:tabLst/>
                       </a:pPr>
                       <a:r>
-                        <a:rPr kumimoji="0" lang="en-US" altLang="ko-KR" sz="1100" b="0" i="0" u="none" strike="noStrike" cap="none" normalizeH="0" baseline="0" smtClean="0">
+                        <a:rPr kumimoji="0" lang="en-US" altLang="ko-KR" sz="1100" b="0" i="0" u="none" strike="noStrike" cap="none" normalizeH="0" baseline="0" dirty="0" smtClean="0">
                           <a:ln>
                             <a:noFill/>
                           </a:ln>
@@ -8554,7 +8530,7 @@
                         <a:t>3</a:t>
                       </a:r>
                       <a:r>
-                        <a:rPr kumimoji="0" lang="ko-KR" altLang="en-US" sz="1100" b="0" i="0" u="none" strike="noStrike" cap="none" normalizeH="0" baseline="0" smtClean="0">
+                        <a:rPr kumimoji="0" lang="ko-KR" altLang="en-US" sz="1100" b="0" i="0" u="none" strike="noStrike" cap="none" normalizeH="0" baseline="0" dirty="0" smtClean="0">
                           <a:ln>
                             <a:noFill/>
                           </a:ln>
@@ -8568,7 +8544,7 @@
                         <a:t>개월 마다</a:t>
                       </a:r>
                       <a:r>
-                        <a:rPr kumimoji="0" lang="en-US" altLang="ko-KR" sz="1100" b="0" i="0" u="none" strike="noStrike" cap="none" normalizeH="0" baseline="0" smtClean="0">
+                        <a:rPr kumimoji="0" lang="en-US" altLang="ko-KR" sz="1100" b="0" i="0" u="none" strike="noStrike" cap="none" normalizeH="0" baseline="0" dirty="0" smtClean="0">
                           <a:ln>
                             <a:noFill/>
                           </a:ln>
@@ -8582,7 +8558,7 @@
                         <a:t> </a:t>
                       </a:r>
                       <a:r>
-                        <a:rPr kumimoji="0" lang="ko-KR" altLang="en-US" sz="1100" b="0" i="0" u="none" strike="noStrike" cap="none" normalizeH="0" baseline="0" smtClean="0">
+                        <a:rPr kumimoji="0" lang="ko-KR" altLang="en-US" sz="1100" b="0" i="0" u="none" strike="noStrike" cap="none" normalizeH="0" baseline="0" dirty="0" smtClean="0">
                           <a:ln>
                             <a:noFill/>
                           </a:ln>
@@ -8595,7 +8571,7 @@
                         </a:rPr>
                         <a:t>강제적으로 패스워드를 변경하게 하는 기능</a:t>
                       </a:r>
-                      <a:endParaRPr kumimoji="0" lang="en-US" altLang="ko-KR" sz="1100" b="0" i="0" u="none" strike="noStrike" cap="none" normalizeH="0" baseline="0" smtClean="0">
+                      <a:endParaRPr kumimoji="0" lang="en-US" altLang="ko-KR" sz="1100" b="0" i="0" u="none" strike="noStrike" cap="none" normalizeH="0" baseline="0" dirty="0" smtClean="0">
                         <a:ln>
                           <a:noFill/>
                         </a:ln>
@@ -8999,7 +8975,7 @@
                         <a:tabLst/>
                       </a:pPr>
                       <a:r>
-                        <a:rPr kumimoji="0" lang="ko-KR" altLang="en-US" sz="1100" b="0" i="0" u="none" strike="noStrike" cap="none" normalizeH="0" baseline="0" smtClean="0">
+                        <a:rPr kumimoji="0" lang="ko-KR" altLang="en-US" sz="1100" b="0" i="0" u="none" strike="noStrike" cap="none" normalizeH="0" baseline="0" dirty="0" smtClean="0">
                           <a:ln>
                             <a:noFill/>
                           </a:ln>
@@ -9013,7 +8989,7 @@
                         <a:t>패스워드는 최소길이 </a:t>
                       </a:r>
                       <a:r>
-                        <a:rPr kumimoji="0" lang="en-US" altLang="ko-KR" sz="1100" b="0" i="0" u="none" strike="noStrike" cap="none" normalizeH="0" baseline="0" smtClean="0">
+                        <a:rPr kumimoji="0" lang="en-US" altLang="ko-KR" sz="1100" b="0" i="0" u="none" strike="noStrike" cap="none" normalizeH="0" baseline="0" dirty="0" smtClean="0">
                           <a:ln>
                             <a:noFill/>
                           </a:ln>
@@ -9027,7 +9003,7 @@
                         <a:t>10</a:t>
                       </a:r>
                       <a:r>
-                        <a:rPr kumimoji="0" lang="ko-KR" altLang="en-US" sz="1100" b="0" i="0" u="none" strike="noStrike" cap="none" normalizeH="0" baseline="0" smtClean="0">
+                        <a:rPr kumimoji="0" lang="ko-KR" altLang="en-US" sz="1100" b="0" i="0" u="none" strike="noStrike" cap="none" normalizeH="0" baseline="0" dirty="0" smtClean="0">
                           <a:ln>
                             <a:noFill/>
                           </a:ln>
@@ -9040,7 +9016,7 @@
                         </a:rPr>
                         <a:t>자 이상 사용하게 하는 기능</a:t>
                       </a:r>
-                      <a:endParaRPr kumimoji="0" lang="en-US" altLang="ko-KR" sz="1100" b="0" i="0" u="none" strike="noStrike" cap="none" normalizeH="0" baseline="0" smtClean="0">
+                      <a:endParaRPr kumimoji="0" lang="en-US" altLang="ko-KR" sz="1100" b="0" i="0" u="none" strike="noStrike" cap="none" normalizeH="0" baseline="0" dirty="0" smtClean="0">
                         <a:ln>
                           <a:noFill/>
                         </a:ln>
@@ -10161,7 +10137,7 @@
                         <a:tabLst/>
                       </a:pPr>
                       <a:r>
-                        <a:rPr kumimoji="0" lang="ko-KR" altLang="en-US" sz="1100" b="0" i="0" u="none" strike="noStrike" cap="none" normalizeH="0" baseline="0" smtClean="0">
+                        <a:rPr kumimoji="0" lang="ko-KR" altLang="en-US" sz="1100" b="0" i="0" u="none" strike="noStrike" cap="none" normalizeH="0" baseline="0" dirty="0" smtClean="0">
                           <a:ln>
                             <a:noFill/>
                           </a:ln>
@@ -10175,7 +10151,7 @@
                         <a:t>입력된 패스워드는 별표</a:t>
                       </a:r>
                       <a:r>
-                        <a:rPr kumimoji="0" lang="en-US" altLang="ko-KR" sz="1100" b="0" i="0" u="none" strike="noStrike" cap="none" normalizeH="0" baseline="0" smtClean="0">
+                        <a:rPr kumimoji="0" lang="en-US" altLang="ko-KR" sz="1100" b="0" i="0" u="none" strike="noStrike" cap="none" normalizeH="0" baseline="0" dirty="0" smtClean="0">
                           <a:ln>
                             <a:noFill/>
                           </a:ln>
@@ -10189,7 +10165,7 @@
                         <a:t>(*) </a:t>
                       </a:r>
                       <a:r>
-                        <a:rPr kumimoji="0" lang="ko-KR" altLang="en-US" sz="1100" b="0" i="0" u="none" strike="noStrike" cap="none" normalizeH="0" baseline="0" smtClean="0">
+                        <a:rPr kumimoji="0" lang="ko-KR" altLang="en-US" sz="1100" b="0" i="0" u="none" strike="noStrike" cap="none" normalizeH="0" baseline="0" dirty="0" smtClean="0">
                           <a:ln>
                             <a:noFill/>
                           </a:ln>
@@ -10202,7 +10178,7 @@
                         </a:rPr>
                         <a:t>처리되거나 음영 처리 하여 화면에서 읽을 수 없도록 하는 기능</a:t>
                       </a:r>
-                      <a:endParaRPr kumimoji="0" lang="en-US" altLang="ko-KR" sz="1100" b="0" i="0" u="none" strike="noStrike" cap="none" normalizeH="0" baseline="0" smtClean="0">
+                      <a:endParaRPr kumimoji="0" lang="en-US" altLang="ko-KR" sz="1100" b="0" i="0" u="none" strike="noStrike" cap="none" normalizeH="0" baseline="0" dirty="0" smtClean="0">
                         <a:ln>
                           <a:noFill/>
                         </a:ln>
@@ -10406,18 +10382,6 @@
                         </a:rPr>
                         <a:t>기본기능</a:t>
                       </a:r>
-                      <a:endParaRPr kumimoji="0" lang="ko-KR" altLang="en-US" sz="1100" b="1" i="0" u="none" strike="noStrike" kern="1200" cap="none" normalizeH="0" baseline="0" dirty="0" smtClean="0">
-                        <a:ln>
-                          <a:noFill/>
-                        </a:ln>
-                        <a:solidFill>
-                          <a:schemeClr val="tx1"/>
-                        </a:solidFill>
-                        <a:effectLst/>
-                        <a:latin typeface="Arial" pitchFamily="34" charset="0"/>
-                        <a:ea typeface="돋움" pitchFamily="50" charset="-127"/>
-                        <a:cs typeface="+mn-cs"/>
-                      </a:endParaRPr>
                     </a:p>
                   </a:txBody>
                   <a:tcPr marL="91439" marR="91439" marT="45725" marB="45725" anchor="ctr" horzOverflow="overflow">
@@ -10595,7 +10559,7 @@
                         <a:tabLst/>
                       </a:pPr>
                       <a:r>
-                        <a:rPr kumimoji="0" lang="ko-KR" altLang="en-US" sz="1100" b="0" i="0" u="none" strike="noStrike" cap="none" normalizeH="0" baseline="0" smtClean="0">
+                        <a:rPr kumimoji="0" lang="ko-KR" altLang="en-US" sz="1100" b="0" i="0" u="none" strike="noStrike" cap="none" normalizeH="0" baseline="0" dirty="0" smtClean="0">
                           <a:ln>
                             <a:noFill/>
                           </a:ln>
@@ -10608,7 +10572,7 @@
                         </a:rPr>
                         <a:t>패스워드 초기화 한 후 최초 로그인시 강제적으로 패스워드를 변경시키게 하는 기능</a:t>
                       </a:r>
-                      <a:endParaRPr kumimoji="0" lang="en-US" altLang="ko-KR" sz="1100" b="0" i="0" u="none" strike="noStrike" cap="none" normalizeH="0" baseline="0" smtClean="0">
+                      <a:endParaRPr kumimoji="0" lang="en-US" altLang="ko-KR" sz="1100" b="0" i="0" u="none" strike="noStrike" cap="none" normalizeH="0" baseline="0" dirty="0" smtClean="0">
                         <a:ln>
                           <a:noFill/>
                         </a:ln>
@@ -10812,18 +10776,6 @@
                         </a:rPr>
                         <a:t> 관리자권한으로 가능</a:t>
                       </a:r>
-                      <a:endParaRPr kumimoji="0" lang="ko-KR" altLang="en-US" sz="1100" b="1" i="0" u="none" strike="noStrike" kern="1200" cap="none" normalizeH="0" baseline="0" dirty="0" smtClean="0">
-                        <a:ln>
-                          <a:noFill/>
-                        </a:ln>
-                        <a:solidFill>
-                          <a:schemeClr val="tx1"/>
-                        </a:solidFill>
-                        <a:effectLst/>
-                        <a:latin typeface="Arial" pitchFamily="34" charset="0"/>
-                        <a:ea typeface="돋움" pitchFamily="50" charset="-127"/>
-                        <a:cs typeface="+mn-cs"/>
-                      </a:endParaRPr>
                     </a:p>
                   </a:txBody>
                   <a:tcPr marL="91439" marR="91439" marT="45725" marB="45725" anchor="ctr" horzOverflow="overflow">
@@ -11001,7 +10953,7 @@
                         <a:tabLst/>
                       </a:pPr>
                       <a:r>
-                        <a:rPr kumimoji="0" lang="ko-KR" altLang="en-US" sz="1100" b="0" i="0" u="none" strike="noStrike" cap="none" normalizeH="0" baseline="0" smtClean="0">
+                        <a:rPr kumimoji="0" lang="ko-KR" altLang="en-US" sz="1100" b="0" i="0" u="none" strike="noStrike" cap="none" normalizeH="0" baseline="0" dirty="0" smtClean="0">
                           <a:ln>
                             <a:noFill/>
                           </a:ln>
@@ -11012,9 +10964,37 @@
                           <a:latin typeface="Arial" pitchFamily="34" charset="0"/>
                           <a:ea typeface="돋움" pitchFamily="50" charset="-127"/>
                         </a:rPr>
-                        <a:t>패스워드를 입력하지 않아도 자동으로 로그인되는 것을 방지하기 위해 패스워드 자동저장 기능을 제공하지 않음</a:t>
-                      </a:r>
-                      <a:endParaRPr kumimoji="0" lang="en-US" altLang="ko-KR" sz="1100" b="0" i="0" u="none" strike="noStrike" cap="none" normalizeH="0" baseline="0" smtClean="0">
+                        <a:t>패스워드를 입력하지 않아도 자동으로 </a:t>
+                      </a:r>
+                      <a:r>
+                        <a:rPr kumimoji="0" lang="ko-KR" altLang="en-US" sz="1100" b="0" i="0" u="none" strike="noStrike" cap="none" normalizeH="0" baseline="0" dirty="0" err="1" smtClean="0">
+                          <a:ln>
+                            <a:noFill/>
+                          </a:ln>
+                          <a:solidFill>
+                            <a:schemeClr val="tx1"/>
+                          </a:solidFill>
+                          <a:effectLst/>
+                          <a:latin typeface="Arial" pitchFamily="34" charset="0"/>
+                          <a:ea typeface="돋움" pitchFamily="50" charset="-127"/>
+                        </a:rPr>
+                        <a:t>로그인되는</a:t>
+                      </a:r>
+                      <a:r>
+                        <a:rPr kumimoji="0" lang="ko-KR" altLang="en-US" sz="1100" b="0" i="0" u="none" strike="noStrike" cap="none" normalizeH="0" baseline="0" dirty="0" smtClean="0">
+                          <a:ln>
+                            <a:noFill/>
+                          </a:ln>
+                          <a:solidFill>
+                            <a:schemeClr val="tx1"/>
+                          </a:solidFill>
+                          <a:effectLst/>
+                          <a:latin typeface="Arial" pitchFamily="34" charset="0"/>
+                          <a:ea typeface="돋움" pitchFamily="50" charset="-127"/>
+                        </a:rPr>
+                        <a:t> 것을 방지하기 위해 패스워드 자동저장 기능을 제공하지 않음</a:t>
+                      </a:r>
+                      <a:endParaRPr kumimoji="0" lang="en-US" altLang="ko-KR" sz="1100" b="0" i="0" u="none" strike="noStrike" cap="none" normalizeH="0" baseline="0" dirty="0" smtClean="0">
                         <a:ln>
                           <a:noFill/>
                         </a:ln>
@@ -11492,7 +11472,7 @@
                         <a:tabLst/>
                       </a:pPr>
                       <a:r>
-                        <a:rPr kumimoji="0" lang="ko-KR" altLang="en-US" sz="1100" b="0" i="0" u="none" strike="noStrike" cap="none" normalizeH="0" baseline="0" smtClean="0">
+                        <a:rPr kumimoji="0" lang="ko-KR" altLang="en-US" sz="1100" b="0" i="0" u="none" strike="noStrike" cap="none" normalizeH="0" baseline="0" dirty="0" smtClean="0">
                           <a:ln>
                             <a:noFill/>
                           </a:ln>
@@ -11506,7 +11486,7 @@
                         <a:t>일정횟수</a:t>
                       </a:r>
                       <a:r>
-                        <a:rPr kumimoji="0" lang="en-US" altLang="ko-KR" sz="1100" b="0" i="0" u="none" strike="noStrike" cap="none" normalizeH="0" baseline="0" smtClean="0">
+                        <a:rPr kumimoji="0" lang="en-US" altLang="ko-KR" sz="1100" b="0" i="0" u="none" strike="noStrike" cap="none" normalizeH="0" baseline="0" dirty="0" smtClean="0">
                           <a:ln>
                             <a:noFill/>
                           </a:ln>
@@ -11520,7 +11500,7 @@
                         <a:t>(5</a:t>
                       </a:r>
                       <a:r>
-                        <a:rPr kumimoji="0" lang="ko-KR" altLang="en-US" sz="1100" b="0" i="0" u="none" strike="noStrike" cap="none" normalizeH="0" baseline="0" smtClean="0">
+                        <a:rPr kumimoji="0" lang="ko-KR" altLang="en-US" sz="1100" b="0" i="0" u="none" strike="noStrike" cap="none" normalizeH="0" baseline="0" dirty="0" smtClean="0">
                           <a:ln>
                             <a:noFill/>
                           </a:ln>
@@ -11534,7 +11514,7 @@
                         <a:t>회 이상</a:t>
                       </a:r>
                       <a:r>
-                        <a:rPr kumimoji="0" lang="en-US" altLang="ko-KR" sz="1100" b="0" i="0" u="none" strike="noStrike" cap="none" normalizeH="0" baseline="0" smtClean="0">
+                        <a:rPr kumimoji="0" lang="en-US" altLang="ko-KR" sz="1100" b="0" i="0" u="none" strike="noStrike" cap="none" normalizeH="0" baseline="0" dirty="0" smtClean="0">
                           <a:ln>
                             <a:noFill/>
                           </a:ln>
@@ -11548,7 +11528,7 @@
                         <a:t>) </a:t>
                       </a:r>
                       <a:r>
-                        <a:rPr kumimoji="0" lang="ko-KR" altLang="en-US" sz="1100" b="0" i="0" u="none" strike="noStrike" cap="none" normalizeH="0" baseline="0" smtClean="0">
+                        <a:rPr kumimoji="0" lang="ko-KR" altLang="en-US" sz="1100" b="0" i="0" u="none" strike="noStrike" cap="none" normalizeH="0" baseline="0" dirty="0" smtClean="0">
                           <a:ln>
                             <a:noFill/>
                           </a:ln>
@@ -11559,10 +11539,10 @@
                           <a:latin typeface="Arial" pitchFamily="34" charset="0"/>
                           <a:ea typeface="돋움" pitchFamily="50" charset="-127"/>
                         </a:rPr>
-                        <a:t>로그인 실패시 해당 </a:t>
-                      </a:r>
-                      <a:r>
-                        <a:rPr kumimoji="0" lang="en-US" altLang="ko-KR" sz="1100" b="0" i="0" u="none" strike="noStrike" cap="none" normalizeH="0" baseline="0" smtClean="0">
+                        <a:t>로그인 </a:t>
+                      </a:r>
+                      <a:r>
+                        <a:rPr kumimoji="0" lang="ko-KR" altLang="en-US" sz="1100" b="0" i="0" u="none" strike="noStrike" cap="none" normalizeH="0" baseline="0" dirty="0" err="1" smtClean="0">
                           <a:ln>
                             <a:noFill/>
                           </a:ln>
@@ -11573,10 +11553,10 @@
                           <a:latin typeface="Arial" pitchFamily="34" charset="0"/>
                           <a:ea typeface="돋움" pitchFamily="50" charset="-127"/>
                         </a:rPr>
-                        <a:t>ID</a:t>
-                      </a:r>
-                      <a:r>
-                        <a:rPr kumimoji="0" lang="ko-KR" altLang="en-US" sz="1100" b="0" i="0" u="none" strike="noStrike" cap="none" normalizeH="0" baseline="0" smtClean="0">
+                        <a:t>실패시</a:t>
+                      </a:r>
+                      <a:r>
+                        <a:rPr kumimoji="0" lang="ko-KR" altLang="en-US" sz="1100" b="0" i="0" u="none" strike="noStrike" cap="none" normalizeH="0" baseline="0" dirty="0" smtClean="0">
                           <a:ln>
                             <a:noFill/>
                           </a:ln>
@@ -11587,10 +11567,10 @@
                           <a:latin typeface="Arial" pitchFamily="34" charset="0"/>
                           <a:ea typeface="돋움" pitchFamily="50" charset="-127"/>
                         </a:rPr>
-                        <a:t>에 대한 </a:t>
-                      </a:r>
-                      <a:r>
-                        <a:rPr kumimoji="0" lang="en-US" altLang="ko-KR" sz="1100" b="0" i="0" u="none" strike="noStrike" cap="none" normalizeH="0" baseline="0" smtClean="0">
+                        <a:t> 해당 </a:t>
+                      </a:r>
+                      <a:r>
+                        <a:rPr kumimoji="0" lang="en-US" altLang="ko-KR" sz="1100" b="0" i="0" u="none" strike="noStrike" cap="none" normalizeH="0" baseline="0" dirty="0" smtClean="0">
                           <a:ln>
                             <a:noFill/>
                           </a:ln>
@@ -11601,10 +11581,10 @@
                           <a:latin typeface="Arial" pitchFamily="34" charset="0"/>
                           <a:ea typeface="돋움" pitchFamily="50" charset="-127"/>
                         </a:rPr>
-                        <a:t>Lock </a:t>
-                      </a:r>
-                      <a:r>
-                        <a:rPr kumimoji="0" lang="ko-KR" altLang="en-US" sz="1100" b="0" i="0" u="none" strike="noStrike" cap="none" normalizeH="0" baseline="0" smtClean="0">
+                        <a:t>ID</a:t>
+                      </a:r>
+                      <a:r>
+                        <a:rPr kumimoji="0" lang="ko-KR" altLang="en-US" sz="1100" b="0" i="0" u="none" strike="noStrike" cap="none" normalizeH="0" baseline="0" dirty="0" smtClean="0">
                           <a:ln>
                             <a:noFill/>
                           </a:ln>
@@ -11615,9 +11595,37 @@
                           <a:latin typeface="Arial" pitchFamily="34" charset="0"/>
                           <a:ea typeface="돋움" pitchFamily="50" charset="-127"/>
                         </a:rPr>
+                        <a:t>에 대한 </a:t>
+                      </a:r>
+                      <a:r>
+                        <a:rPr kumimoji="0" lang="en-US" altLang="ko-KR" sz="1100" b="0" i="0" u="none" strike="noStrike" cap="none" normalizeH="0" baseline="0" dirty="0" smtClean="0">
+                          <a:ln>
+                            <a:noFill/>
+                          </a:ln>
+                          <a:solidFill>
+                            <a:schemeClr val="tx1"/>
+                          </a:solidFill>
+                          <a:effectLst/>
+                          <a:latin typeface="Arial" pitchFamily="34" charset="0"/>
+                          <a:ea typeface="돋움" pitchFamily="50" charset="-127"/>
+                        </a:rPr>
+                        <a:t>Lock </a:t>
+                      </a:r>
+                      <a:r>
+                        <a:rPr kumimoji="0" lang="ko-KR" altLang="en-US" sz="1100" b="0" i="0" u="none" strike="noStrike" cap="none" normalizeH="0" baseline="0" dirty="0" smtClean="0">
+                          <a:ln>
+                            <a:noFill/>
+                          </a:ln>
+                          <a:solidFill>
+                            <a:schemeClr val="tx1"/>
+                          </a:solidFill>
+                          <a:effectLst/>
+                          <a:latin typeface="Arial" pitchFamily="34" charset="0"/>
+                          <a:ea typeface="돋움" pitchFamily="50" charset="-127"/>
+                        </a:rPr>
                         <a:t>기능</a:t>
                       </a:r>
-                      <a:endParaRPr kumimoji="0" lang="en-US" altLang="ko-KR" sz="1100" b="0" i="0" u="none" strike="noStrike" cap="none" normalizeH="0" baseline="0" smtClean="0">
+                      <a:endParaRPr kumimoji="0" lang="en-US" altLang="ko-KR" sz="1100" b="0" i="0" u="none" strike="noStrike" cap="none" normalizeH="0" baseline="0" dirty="0" smtClean="0">
                         <a:ln>
                           <a:noFill/>
                         </a:ln>
@@ -11805,17 +11813,6 @@
                         </a:rPr>
                         <a:t>불필요</a:t>
                       </a:r>
-                      <a:endParaRPr kumimoji="0" lang="ko-KR" altLang="en-US" sz="1100" b="1" i="0" u="none" strike="noStrike" cap="none" normalizeH="0" baseline="0" dirty="0" smtClean="0">
-                        <a:ln>
-                          <a:noFill/>
-                        </a:ln>
-                        <a:solidFill>
-                          <a:schemeClr val="tx1"/>
-                        </a:solidFill>
-                        <a:effectLst/>
-                        <a:latin typeface="Arial" pitchFamily="34" charset="0"/>
-                        <a:ea typeface="돋움" pitchFamily="50" charset="-127"/>
-                      </a:endParaRPr>
                     </a:p>
                   </a:txBody>
                   <a:tcPr marL="91439" marR="91439" marT="45725" marB="45725" anchor="ctr" horzOverflow="overflow">
@@ -11993,7 +11990,7 @@
                         <a:tabLst/>
                       </a:pPr>
                       <a:r>
-                        <a:rPr kumimoji="0" lang="ko-KR" altLang="ko-KR" sz="1100" b="0" i="0" u="none" strike="noStrike" cap="none" normalizeH="0" baseline="0" smtClean="0">
+                        <a:rPr kumimoji="0" lang="ko-KR" altLang="ko-KR" sz="1100" b="0" i="0" u="none" strike="noStrike" cap="none" normalizeH="0" baseline="0" dirty="0" smtClean="0">
                           <a:ln>
                             <a:noFill/>
                           </a:ln>
@@ -12004,10 +12001,10 @@
                           <a:latin typeface="Arial" pitchFamily="34" charset="0"/>
                           <a:ea typeface="돋움" pitchFamily="50" charset="-127"/>
                         </a:rPr>
-                        <a:t>로그인 실패시</a:t>
-                      </a:r>
-                      <a:r>
-                        <a:rPr kumimoji="0" lang="en-US" altLang="ko-KR" sz="1100" b="0" i="0" u="none" strike="noStrike" cap="none" normalizeH="0" baseline="0" smtClean="0">
+                        <a:t>로그인 </a:t>
+                      </a:r>
+                      <a:r>
+                        <a:rPr kumimoji="0" lang="ko-KR" altLang="ko-KR" sz="1100" b="0" i="0" u="none" strike="noStrike" cap="none" normalizeH="0" baseline="0" dirty="0" err="1" smtClean="0">
                           <a:ln>
                             <a:noFill/>
                           </a:ln>
@@ -12018,10 +12015,10 @@
                           <a:latin typeface="Arial" pitchFamily="34" charset="0"/>
                           <a:ea typeface="돋움" pitchFamily="50" charset="-127"/>
                         </a:rPr>
-                        <a:t>, </a:t>
-                      </a:r>
-                      <a:r>
-                        <a:rPr kumimoji="0" lang="ko-KR" altLang="ko-KR" sz="1100" b="0" i="0" u="none" strike="noStrike" cap="none" normalizeH="0" baseline="0" smtClean="0">
+                        <a:t>실패시</a:t>
+                      </a:r>
+                      <a:r>
+                        <a:rPr kumimoji="0" lang="en-US" altLang="ko-KR" sz="1100" b="0" i="0" u="none" strike="noStrike" cap="none" normalizeH="0" baseline="0" dirty="0" smtClean="0">
                           <a:ln>
                             <a:noFill/>
                           </a:ln>
@@ -12032,9 +12029,23 @@
                           <a:latin typeface="Arial" pitchFamily="34" charset="0"/>
                           <a:ea typeface="돋움" pitchFamily="50" charset="-127"/>
                         </a:rPr>
+                        <a:t>, </a:t>
+                      </a:r>
+                      <a:r>
+                        <a:rPr kumimoji="0" lang="ko-KR" altLang="ko-KR" sz="1100" b="0" i="0" u="none" strike="noStrike" cap="none" normalizeH="0" baseline="0" dirty="0" smtClean="0">
+                          <a:ln>
+                            <a:noFill/>
+                          </a:ln>
+                          <a:solidFill>
+                            <a:schemeClr val="tx1"/>
+                          </a:solidFill>
+                          <a:effectLst/>
+                          <a:latin typeface="Arial" pitchFamily="34" charset="0"/>
+                          <a:ea typeface="돋움" pitchFamily="50" charset="-127"/>
+                        </a:rPr>
                         <a:t>원인을 사용자에게 피드백 하지 않고 단순히 로그인 절차가 잘못 되었다는 정보만 표시 </a:t>
                       </a:r>
-                      <a:endParaRPr kumimoji="0" lang="en-US" altLang="ko-KR" sz="1100" b="0" i="0" u="none" strike="noStrike" cap="none" normalizeH="0" baseline="0" smtClean="0">
+                      <a:endParaRPr kumimoji="0" lang="en-US" altLang="ko-KR" sz="1100" b="0" i="0" u="none" strike="noStrike" cap="none" normalizeH="0" baseline="0" dirty="0" smtClean="0">
                         <a:ln>
                           <a:noFill/>
                         </a:ln>
@@ -12523,14 +12534,14 @@
           <p:nvPr>
             <p:extLst>
               <p:ext uri="{D42A27DB-BD31-4B8C-83A1-F6EECF244321}">
-                <p14:modId xmlns:p14="http://schemas.microsoft.com/office/powerpoint/2010/main" val="362809326"/>
+                <p14:modId xmlns:p14="http://schemas.microsoft.com/office/powerpoint/2010/main" val="3901121546"/>
               </p:ext>
             </p:extLst>
           </p:nvPr>
         </p:nvGraphicFramePr>
         <p:xfrm>
           <a:off x="238125" y="642938"/>
-          <a:ext cx="9429750" cy="5427664"/>
+          <a:ext cx="9429750" cy="5356538"/>
         </p:xfrm>
         <a:graphic>
           <a:graphicData uri="http://schemas.openxmlformats.org/drawingml/2006/table">
@@ -13490,7 +13501,7 @@
                   </a:tcPr>
                 </a:tc>
               </a:tr>
-              <a:tr h="497824">
+              <a:tr h="419560">
                 <a:tc vMerge="1">
                   <a:txBody>
                     <a:bodyPr/>
@@ -15023,18 +15034,6 @@
                         </a:rPr>
                         <a:t>불필요</a:t>
                       </a:r>
-                      <a:endParaRPr kumimoji="0" lang="ko-KR" altLang="en-US" sz="1100" b="0" i="0" u="none" strike="noStrike" kern="1200" cap="none" normalizeH="0" baseline="0" dirty="0" smtClean="0">
-                        <a:ln>
-                          <a:noFill/>
-                        </a:ln>
-                        <a:solidFill>
-                          <a:schemeClr val="tx1"/>
-                        </a:solidFill>
-                        <a:effectLst/>
-                        <a:latin typeface="+mn-lt"/>
-                        <a:ea typeface="+mn-ea"/>
-                        <a:cs typeface="+mn-cs"/>
-                      </a:endParaRPr>
                     </a:p>
                   </a:txBody>
                   <a:tcPr marL="91439" marR="91439" marT="45709" marB="45709" anchor="ctr" horzOverflow="overflow">
@@ -17499,22 +17498,7 @@
                           <a:ea typeface="+mj-ea"/>
                           <a:cs typeface="+mn-cs"/>
                         </a:rPr>
-                        <a:t>에 </a:t>
-                      </a:r>
-                      <a:r>
-                        <a:rPr kumimoji="0" lang="ko-KR" altLang="en-US" sz="1100" b="0" i="0" u="none" strike="noStrike" kern="1200" cap="none" normalizeH="0" baseline="0" dirty="0" smtClean="0">
-                          <a:ln>
-                            <a:noFill/>
-                          </a:ln>
-                          <a:solidFill>
-                            <a:schemeClr val="tx1"/>
-                          </a:solidFill>
-                          <a:effectLst/>
-                          <a:latin typeface="+mj-lt"/>
-                          <a:ea typeface="+mj-ea"/>
-                          <a:cs typeface="+mn-cs"/>
-                        </a:rPr>
-                        <a:t>기록</a:t>
+                        <a:t>에 기록</a:t>
                       </a:r>
                     </a:p>
                   </a:txBody>
@@ -24599,18 +24583,6 @@
                         </a:rPr>
                         <a:t>파일업로드는 필요기능</a:t>
                       </a:r>
-                      <a:endParaRPr kumimoji="0" lang="ko-KR" altLang="en-US" sz="1100" b="0" i="0" u="none" strike="noStrike" kern="1200" cap="none" normalizeH="0" baseline="0" dirty="0" smtClean="0">
-                        <a:ln>
-                          <a:noFill/>
-                        </a:ln>
-                        <a:solidFill>
-                          <a:schemeClr val="tx1"/>
-                        </a:solidFill>
-                        <a:effectLst/>
-                        <a:latin typeface="+mj-lt"/>
-                        <a:ea typeface="+mj-ea"/>
-                        <a:cs typeface="+mn-cs"/>
-                      </a:endParaRPr>
                     </a:p>
                   </a:txBody>
                   <a:tcPr marL="91439" marR="91439" marT="45725" marB="45725" anchor="ctr" horzOverflow="overflow">
@@ -26973,14 +26945,6 @@
                         </a:rPr>
                         <a:t> 별도존재</a:t>
                       </a:r>
-                      <a:endParaRPr lang="ko-KR" altLang="en-US" sz="1100" kern="1200" dirty="0" smtClean="0">
-                        <a:solidFill>
-                          <a:schemeClr val="tx1"/>
-                        </a:solidFill>
-                        <a:latin typeface="+mn-lt"/>
-                        <a:ea typeface="+mn-ea"/>
-                        <a:cs typeface="+mn-cs"/>
-                      </a:endParaRPr>
                     </a:p>
                   </a:txBody>
                   <a:tcPr marL="91439" marR="91439" marT="45719" marB="45719" anchor="ctr" horzOverflow="overflow">
@@ -27451,18 +27415,6 @@
                         </a:rPr>
                         <a:t>중요정보 없음</a:t>
                       </a:r>
-                      <a:endParaRPr kumimoji="0" lang="ko-KR" altLang="en-US" sz="1100" b="0" i="0" u="none" strike="noStrike" kern="1200" cap="none" normalizeH="0" baseline="0" dirty="0" smtClean="0">
-                        <a:ln>
-                          <a:noFill/>
-                        </a:ln>
-                        <a:solidFill>
-                          <a:schemeClr val="tx1"/>
-                        </a:solidFill>
-                        <a:effectLst/>
-                        <a:latin typeface="+mj-lt"/>
-                        <a:ea typeface="+mj-ea"/>
-                        <a:cs typeface="+mn-cs"/>
-                      </a:endParaRPr>
                     </a:p>
                   </a:txBody>
                   <a:tcPr marL="91439" marR="91439" marT="45719" marB="45719" anchor="ctr" horzOverflow="overflow">
@@ -28034,18 +27986,6 @@
                         </a:rPr>
                         <a:t>중요정보 없음</a:t>
                       </a:r>
-                      <a:endParaRPr kumimoji="0" lang="ko-KR" altLang="en-US" sz="1100" b="0" i="0" u="none" strike="noStrike" kern="1200" cap="none" normalizeH="0" baseline="0" dirty="0" smtClean="0">
-                        <a:ln>
-                          <a:noFill/>
-                        </a:ln>
-                        <a:solidFill>
-                          <a:schemeClr val="tx1"/>
-                        </a:solidFill>
-                        <a:effectLst/>
-                        <a:latin typeface="+mj-lt"/>
-                        <a:ea typeface="+mj-ea"/>
-                        <a:cs typeface="+mn-cs"/>
-                      </a:endParaRPr>
                     </a:p>
                   </a:txBody>
                   <a:tcPr marL="91439" marR="91439" marT="45719" marB="45719" anchor="ctr" horzOverflow="overflow">
@@ -29940,14 +29880,6 @@
                         </a:rPr>
                         <a:t>관리자아이디로 추가 가입 및 접근불가</a:t>
                       </a:r>
-                      <a:endParaRPr lang="ko-KR" altLang="en-US" sz="1100" kern="1200" dirty="0" smtClean="0">
-                        <a:solidFill>
-                          <a:schemeClr val="tx1"/>
-                        </a:solidFill>
-                        <a:latin typeface="+mj-lt"/>
-                        <a:ea typeface="+mj-ea"/>
-                        <a:cs typeface="+mn-cs"/>
-                      </a:endParaRPr>
                     </a:p>
                   </a:txBody>
                   <a:tcPr marL="91439" marR="91439" marT="45721" marB="45721" anchor="ctr" horzOverflow="overflow">

</xml_diff>

<commit_message>
disable auto saving of loginID/password
</commit_message>
<xml_diff>
--- a/documents/자재관리시스템_보안점검 결과서.pptx
+++ b/documents/자재관리시스템_보안점검 결과서.pptx
@@ -247,7 +247,7 @@
               <a:pPr>
                 <a:defRPr/>
               </a:pPr>
-              <a:t>2017-03-06</a:t>
+              <a:t>2017-03-09</a:t>
             </a:fld>
             <a:endParaRPr lang="ko-KR" altLang="en-US"/>
           </a:p>
@@ -6209,7 +6209,7 @@
           <p:nvPr>
             <p:extLst>
               <p:ext uri="{D42A27DB-BD31-4B8C-83A1-F6EECF244321}">
-                <p14:modId xmlns:p14="http://schemas.microsoft.com/office/powerpoint/2010/main" val="158547075"/>
+                <p14:modId xmlns:p14="http://schemas.microsoft.com/office/powerpoint/2010/main" val="1427809852"/>
               </p:ext>
             </p:extLst>
           </p:nvPr>
@@ -7585,7 +7585,7 @@
                         <a:tabLst/>
                       </a:pPr>
                       <a:r>
-                        <a:rPr kumimoji="0" lang="en-US" altLang="ko-KR" sz="1100" b="0" i="0" u="none" strike="noStrike" cap="none" normalizeH="0" baseline="0" smtClean="0">
+                        <a:rPr kumimoji="0" lang="en-US" altLang="ko-KR" sz="1100" b="0" i="0" u="none" strike="noStrike" cap="none" normalizeH="0" baseline="0" dirty="0" smtClean="0">
                           <a:ln>
                             <a:noFill/>
                           </a:ln>
@@ -8663,7 +8663,7 @@
                           <a:latin typeface="Arial" pitchFamily="34" charset="0"/>
                           <a:ea typeface="돋움" pitchFamily="50" charset="-127"/>
                         </a:rPr>
-                        <a:t>X</a:t>
+                        <a:t>O</a:t>
                       </a:r>
                       <a:endParaRPr kumimoji="0" lang="ko-KR" altLang="en-US" sz="1100" b="0" i="0" u="none" strike="noStrike" cap="none" normalizeH="0" baseline="0" dirty="0" smtClean="0">
                         <a:ln>
@@ -11075,7 +11075,7 @@
                         <a:tabLst/>
                       </a:pPr>
                       <a:r>
-                        <a:rPr kumimoji="0" lang="en-US" altLang="ko-KR" sz="1100" b="0" i="0" u="none" strike="noStrike" cap="none" normalizeH="0" baseline="0" dirty="0" smtClean="0">
+                        <a:rPr kumimoji="0" lang="en-US" altLang="ko-KR" sz="1100" b="0" i="0" u="none" strike="noStrike" cap="none" normalizeH="0" baseline="0" smtClean="0">
                           <a:ln>
                             <a:noFill/>
                           </a:ln>
@@ -11086,7 +11086,7 @@
                           <a:latin typeface="Arial" pitchFamily="34" charset="0"/>
                           <a:ea typeface="돋움" pitchFamily="50" charset="-127"/>
                         </a:rPr>
-                        <a:t>X</a:t>
+                        <a:t>O</a:t>
                       </a:r>
                       <a:endParaRPr kumimoji="0" lang="ko-KR" altLang="en-US" sz="1100" b="0" i="0" u="none" strike="noStrike" cap="none" normalizeH="0" baseline="0" dirty="0" smtClean="0">
                         <a:ln>
@@ -11717,7 +11717,7 @@
                           <a:latin typeface="Arial" pitchFamily="34" charset="0"/>
                           <a:ea typeface="돋움" pitchFamily="50" charset="-127"/>
                         </a:rPr>
-                        <a:t>X</a:t>
+                        <a:t>O</a:t>
                       </a:r>
                       <a:endParaRPr kumimoji="0" lang="ko-KR" altLang="en-US" sz="1100" b="0" i="0" u="none" strike="noStrike" cap="none" normalizeH="0" baseline="0" dirty="0" smtClean="0">
                         <a:ln>

</xml_diff>

<commit_message>
Log 'login success' and 'excel export' to DB
</commit_message>
<xml_diff>
--- a/documents/자재관리시스템_보안점검 결과서.pptx
+++ b/documents/자재관리시스템_보안점검 결과서.pptx
@@ -247,7 +247,7 @@
               <a:pPr>
                 <a:defRPr/>
               </a:pPr>
-              <a:t>2017-03-09</a:t>
+              <a:t>2017-03-19</a:t>
             </a:fld>
             <a:endParaRPr lang="ko-KR" altLang="en-US"/>
           </a:p>
@@ -3289,7 +3289,7 @@
           <p:cNvSpPr>
             <a:spLocks noChangeShapeType="1"/>
           </p:cNvSpPr>
-          <p:nvPr userDrawn="1"/>
+          <p:nvPr/>
         </p:nvSpPr>
         <p:spPr bwMode="auto">
           <a:xfrm>
@@ -3330,7 +3330,7 @@
           <p:cNvSpPr>
             <a:spLocks noChangeShapeType="1"/>
           </p:cNvSpPr>
-          <p:nvPr userDrawn="1"/>
+          <p:nvPr/>
         </p:nvSpPr>
         <p:spPr bwMode="auto">
           <a:xfrm>
@@ -3371,7 +3371,7 @@
           <p:cNvSpPr>
             <a:spLocks noChangeArrowheads="1"/>
           </p:cNvSpPr>
-          <p:nvPr userDrawn="1"/>
+          <p:nvPr/>
         </p:nvSpPr>
         <p:spPr bwMode="auto">
           <a:xfrm>
@@ -3435,7 +3435,7 @@
         <p:nvSpPr>
           <p:cNvPr id="8" name="TextBox 7"/>
           <p:cNvSpPr txBox="1"/>
-          <p:nvPr userDrawn="1"/>
+          <p:nvPr/>
         </p:nvSpPr>
         <p:spPr>
           <a:xfrm>
@@ -3590,7 +3590,7 @@
         <p:nvSpPr>
           <p:cNvPr id="11" name="TextBox 10"/>
           <p:cNvSpPr txBox="1"/>
-          <p:nvPr userDrawn="1"/>
+          <p:nvPr/>
         </p:nvSpPr>
         <p:spPr>
           <a:xfrm>
@@ -3665,7 +3665,7 @@
           <p:cNvPicPr>
             <a:picLocks noChangeAspect="1"/>
           </p:cNvPicPr>
-          <p:nvPr userDrawn="1"/>
+          <p:nvPr/>
         </p:nvPicPr>
         <p:blipFill>
           <a:blip r:embed="rId13">
@@ -6209,7 +6209,7 @@
           <p:nvPr>
             <p:extLst>
               <p:ext uri="{D42A27DB-BD31-4B8C-83A1-F6EECF244321}">
-                <p14:modId xmlns:p14="http://schemas.microsoft.com/office/powerpoint/2010/main" val="1427809852"/>
+                <p14:modId xmlns:p14="http://schemas.microsoft.com/office/powerpoint/2010/main" val="1199968079"/>
               </p:ext>
             </p:extLst>
           </p:nvPr>
@@ -9108,7 +9108,7 @@
                           <a:latin typeface="Arial" pitchFamily="34" charset="0"/>
                           <a:ea typeface="돋움" pitchFamily="50" charset="-127"/>
                         </a:rPr>
-                        <a:t>X</a:t>
+                        <a:t>O</a:t>
                       </a:r>
                       <a:endParaRPr kumimoji="0" lang="ko-KR" altLang="en-US" sz="1100" b="0" i="0" u="none" strike="noStrike" cap="none" normalizeH="0" baseline="0" dirty="0" smtClean="0">
                         <a:ln>
@@ -9797,19 +9797,54 @@
                           <a:latin typeface="Arial" pitchFamily="34" charset="0"/>
                           <a:ea typeface="돋움" pitchFamily="50" charset="-127"/>
                         </a:rPr>
-                        <a:t>X</a:t>
-                      </a:r>
-                      <a:endParaRPr kumimoji="0" lang="ko-KR" altLang="en-US" sz="1100" b="0" i="0" u="none" strike="noStrike" cap="none" normalizeH="0" baseline="0" dirty="0" smtClean="0">
-                        <a:ln>
-                          <a:noFill/>
-                        </a:ln>
-                        <a:solidFill>
-                          <a:schemeClr val="tx1"/>
-                        </a:solidFill>
-                        <a:effectLst/>
-                        <a:latin typeface="Arial" pitchFamily="34" charset="0"/>
-                        <a:ea typeface="돋움" pitchFamily="50" charset="-127"/>
-                      </a:endParaRPr>
+                        <a:t>O</a:t>
+                      </a:r>
+                    </a:p>
+                    <a:p>
+                      <a:pPr marL="0" marR="0" lvl="0" indent="0" algn="ctr" defTabSz="914400" rtl="0" eaLnBrk="1" fontAlgn="base" latinLnBrk="1" hangingPunct="1">
+                        <a:lnSpc>
+                          <a:spcPct val="100000"/>
+                        </a:lnSpc>
+                        <a:spcBef>
+                          <a:spcPct val="20000"/>
+                        </a:spcBef>
+                        <a:spcAft>
+                          <a:spcPct val="0"/>
+                        </a:spcAft>
+                        <a:buClrTx/>
+                        <a:buSzTx/>
+                        <a:buFontTx/>
+                        <a:buNone/>
+                        <a:tabLst/>
+                      </a:pPr>
+                      <a:r>
+                        <a:rPr kumimoji="0" lang="en-US" altLang="ko-KR" sz="1100" b="0" i="0" u="none" strike="noStrike" cap="none" normalizeH="0" baseline="0" dirty="0" smtClean="0">
+                          <a:ln>
+                            <a:noFill/>
+                          </a:ln>
+                          <a:solidFill>
+                            <a:schemeClr val="tx1"/>
+                          </a:solidFill>
+                          <a:effectLst/>
+                          <a:latin typeface="Arial" pitchFamily="34" charset="0"/>
+                          <a:ea typeface="돋움" pitchFamily="50" charset="-127"/>
+                        </a:rPr>
+                        <a:t>1,3 </a:t>
+                      </a:r>
+                      <a:r>
+                        <a:rPr kumimoji="0" lang="ko-KR" altLang="en-US" sz="1100" b="0" i="0" u="none" strike="noStrike" cap="none" normalizeH="0" baseline="0" dirty="0" smtClean="0">
+                          <a:ln>
+                            <a:noFill/>
+                          </a:ln>
+                          <a:solidFill>
+                            <a:schemeClr val="tx1"/>
+                          </a:solidFill>
+                          <a:effectLst/>
+                          <a:latin typeface="Arial" pitchFamily="34" charset="0"/>
+                          <a:ea typeface="돋움" pitchFamily="50" charset="-127"/>
+                        </a:rPr>
+                        <a:t>적용</a:t>
+                      </a:r>
                     </a:p>
                   </a:txBody>
                   <a:tcPr marL="91439" marR="91439" marT="45725" marB="45725" anchor="ctr" horzOverflow="overflow">
@@ -11075,7 +11110,7 @@
                         <a:tabLst/>
                       </a:pPr>
                       <a:r>
-                        <a:rPr kumimoji="0" lang="en-US" altLang="ko-KR" sz="1100" b="0" i="0" u="none" strike="noStrike" cap="none" normalizeH="0" baseline="0" smtClean="0">
+                        <a:rPr kumimoji="0" lang="en-US" altLang="ko-KR" sz="1100" b="0" i="0" u="none" strike="noStrike" cap="none" normalizeH="0" baseline="0" dirty="0" smtClean="0">
                           <a:ln>
                             <a:noFill/>
                           </a:ln>
@@ -12534,7 +12569,7 @@
           <p:nvPr>
             <p:extLst>
               <p:ext uri="{D42A27DB-BD31-4B8C-83A1-F6EECF244321}">
-                <p14:modId xmlns:p14="http://schemas.microsoft.com/office/powerpoint/2010/main" val="3901121546"/>
+                <p14:modId xmlns:p14="http://schemas.microsoft.com/office/powerpoint/2010/main" val="3251757893"/>
               </p:ext>
             </p:extLst>
           </p:nvPr>
@@ -14439,21 +14474,6 @@
                         <a:buNone/>
                         <a:tabLst/>
                       </a:pPr>
-                      <a:r>
-                        <a:rPr kumimoji="0" lang="ko-KR" altLang="en-US" sz="1100" b="0" i="0" u="none" strike="noStrike" kern="1200" cap="none" normalizeH="0" baseline="0" dirty="0" smtClean="0">
-                          <a:ln>
-                            <a:noFill/>
-                          </a:ln>
-                          <a:solidFill>
-                            <a:schemeClr val="tx1"/>
-                          </a:solidFill>
-                          <a:effectLst/>
-                          <a:latin typeface="+mn-lt"/>
-                          <a:ea typeface="+mn-ea"/>
-                          <a:cs typeface="+mn-cs"/>
-                        </a:rPr>
-                        <a:t>불필요</a:t>
-                      </a:r>
                       <a:endParaRPr kumimoji="0" lang="ko-KR" altLang="en-US" sz="1100" b="0" i="0" u="none" strike="noStrike" kern="1200" cap="none" normalizeH="0" baseline="0" dirty="0" smtClean="0">
                         <a:ln>
                           <a:noFill/>
@@ -15019,21 +15039,18 @@
                         <a:buNone/>
                         <a:tabLst/>
                       </a:pPr>
-                      <a:r>
-                        <a:rPr kumimoji="0" lang="ko-KR" altLang="en-US" sz="1100" b="0" i="0" u="none" strike="noStrike" kern="1200" cap="none" normalizeH="0" baseline="0" dirty="0" smtClean="0">
-                          <a:ln>
-                            <a:noFill/>
-                          </a:ln>
-                          <a:solidFill>
-                            <a:schemeClr val="tx1"/>
-                          </a:solidFill>
-                          <a:effectLst/>
-                          <a:latin typeface="+mn-lt"/>
-                          <a:ea typeface="+mn-ea"/>
-                          <a:cs typeface="+mn-cs"/>
-                        </a:rPr>
-                        <a:t>불필요</a:t>
-                      </a:r>
+                      <a:endParaRPr kumimoji="0" lang="ko-KR" altLang="en-US" sz="1100" b="0" i="0" u="none" strike="noStrike" kern="1200" cap="none" normalizeH="0" baseline="0" dirty="0" smtClean="0">
+                        <a:ln>
+                          <a:noFill/>
+                        </a:ln>
+                        <a:solidFill>
+                          <a:schemeClr val="tx1"/>
+                        </a:solidFill>
+                        <a:effectLst/>
+                        <a:latin typeface="+mn-lt"/>
+                        <a:ea typeface="+mn-ea"/>
+                        <a:cs typeface="+mn-cs"/>
+                      </a:endParaRPr>
                     </a:p>
                   </a:txBody>
                   <a:tcPr marL="91439" marR="91439" marT="45709" marB="45709" anchor="ctr" horzOverflow="overflow">
@@ -15414,7 +15431,7 @@
                           <a:ea typeface="+mj-ea"/>
                           <a:cs typeface="+mn-cs"/>
                         </a:rPr>
-                        <a:t>X</a:t>
+                        <a:t>NA</a:t>
                       </a:r>
                       <a:endParaRPr kumimoji="0" lang="ko-KR" altLang="en-US" sz="1100" b="0" i="0" u="none" strike="noStrike" kern="1200" cap="none" normalizeH="0" baseline="0" dirty="0" smtClean="0">
                         <a:ln>
@@ -16959,7 +16976,7 @@
                           <a:ea typeface="+mj-ea"/>
                           <a:cs typeface="+mn-cs"/>
                         </a:rPr>
-                        <a:t>X</a:t>
+                        <a:t>O</a:t>
                       </a:r>
                       <a:endParaRPr kumimoji="0" lang="ko-KR" altLang="en-US" sz="1100" b="0" i="0" u="none" strike="noStrike" kern="1200" cap="none" normalizeH="0" baseline="0" dirty="0" smtClean="0">
                         <a:ln>
@@ -17044,7 +17061,7 @@
                         <a:defRPr/>
                       </a:pPr>
                       <a:r>
-                        <a:rPr kumimoji="0" lang="ko-KR" altLang="en-US" sz="1100" b="1" i="0" u="none" strike="noStrike" kern="1200" cap="none" normalizeH="0" baseline="0" dirty="0" err="1" smtClean="0">
+                        <a:rPr kumimoji="0" lang="en-US" altLang="ko-KR" sz="1100" b="0" i="0" u="none" strike="noStrike" kern="1200" cap="none" normalizeH="0" baseline="0" dirty="0" smtClean="0">
                           <a:ln>
                             <a:noFill/>
                           </a:ln>
@@ -17056,7 +17073,22 @@
                           <a:ea typeface="+mn-ea"/>
                           <a:cs typeface="+mn-cs"/>
                         </a:rPr>
-                        <a:t>안함</a:t>
+                        <a:t>DB</a:t>
+                      </a:r>
+                      <a:r>
+                        <a:rPr kumimoji="0" lang="ko-KR" altLang="en-US" sz="1100" b="0" i="0" u="none" strike="noStrike" kern="1200" cap="none" normalizeH="0" baseline="0" dirty="0" smtClean="0">
+                          <a:ln>
+                            <a:noFill/>
+                          </a:ln>
+                          <a:solidFill>
+                            <a:schemeClr val="tx1"/>
+                          </a:solidFill>
+                          <a:effectLst/>
+                          <a:latin typeface="+mn-lt"/>
+                          <a:ea typeface="+mn-ea"/>
+                          <a:cs typeface="+mn-cs"/>
+                        </a:rPr>
+                        <a:t>에 기록</a:t>
                       </a:r>
                       <a:endParaRPr kumimoji="0" lang="ko-KR" altLang="en-US" sz="1100" b="1" i="0" u="none" strike="noStrike" kern="1200" cap="none" normalizeH="0" baseline="0" dirty="0" smtClean="0">
                         <a:ln>
@@ -17773,7 +17805,7 @@
           <p:nvPr>
             <p:extLst>
               <p:ext uri="{D42A27DB-BD31-4B8C-83A1-F6EECF244321}">
-                <p14:modId xmlns:p14="http://schemas.microsoft.com/office/powerpoint/2010/main" val="1996463396"/>
+                <p14:modId xmlns:p14="http://schemas.microsoft.com/office/powerpoint/2010/main" val="2457269692"/>
               </p:ext>
             </p:extLst>
           </p:nvPr>
@@ -21294,7 +21326,7 @@
                           <a:ea typeface="+mj-ea"/>
                           <a:cs typeface="+mn-cs"/>
                         </a:rPr>
-                        <a:t>N</a:t>
+                        <a:t>O</a:t>
                       </a:r>
                       <a:endParaRPr kumimoji="0" lang="ko-KR" altLang="en-US" sz="1100" b="0" i="0" u="none" strike="noStrike" kern="1200" cap="none" normalizeH="0" baseline="0" dirty="0" smtClean="0">
                         <a:ln>
@@ -21379,7 +21411,7 @@
                         <a:defRPr/>
                       </a:pPr>
                       <a:r>
-                        <a:rPr kumimoji="0" lang="ko-KR" altLang="en-US" sz="1100" b="1" i="0" u="none" strike="noStrike" kern="1200" cap="none" normalizeH="0" baseline="0" dirty="0" err="1" smtClean="0">
+                        <a:rPr kumimoji="0" lang="ko-KR" altLang="en-US" sz="1100" b="0" i="0" u="none" strike="noStrike" kern="1200" cap="none" normalizeH="0" baseline="0" dirty="0" smtClean="0">
                           <a:ln>
                             <a:noFill/>
                           </a:ln>
@@ -21391,9 +21423,39 @@
                           <a:ea typeface="+mn-ea"/>
                           <a:cs typeface="+mn-cs"/>
                         </a:rPr>
-                        <a:t>중요정보없음</a:t>
-                      </a:r>
-                      <a:endParaRPr kumimoji="0" lang="ko-KR" altLang="en-US" sz="1100" b="1" i="0" u="none" strike="noStrike" kern="1200" cap="none" normalizeH="0" baseline="0" dirty="0" smtClean="0">
+                        <a:t>엑셀다운로드시도 </a:t>
+                      </a:r>
+                      <a:r>
+                        <a:rPr kumimoji="0" lang="en-US" altLang="ko-KR" sz="1100" b="0" i="0" u="none" strike="noStrike" kern="1200" cap="none" normalizeH="0" baseline="0" dirty="0" smtClean="0">
+                          <a:ln>
+                            <a:noFill/>
+                          </a:ln>
+                          <a:solidFill>
+                            <a:schemeClr val="tx1"/>
+                          </a:solidFill>
+                          <a:effectLst/>
+                          <a:latin typeface="+mn-lt"/>
+                          <a:ea typeface="+mn-ea"/>
+                          <a:cs typeface="+mn-cs"/>
+                        </a:rPr>
+                        <a:t>DB</a:t>
+                      </a:r>
+                      <a:r>
+                        <a:rPr kumimoji="0" lang="ko-KR" altLang="en-US" sz="1100" b="0" i="0" u="none" strike="noStrike" kern="1200" cap="none" normalizeH="0" baseline="0" dirty="0" smtClean="0">
+                          <a:ln>
+                            <a:noFill/>
+                          </a:ln>
+                          <a:solidFill>
+                            <a:schemeClr val="tx1"/>
+                          </a:solidFill>
+                          <a:effectLst/>
+                          <a:latin typeface="+mn-lt"/>
+                          <a:ea typeface="+mn-ea"/>
+                          <a:cs typeface="+mn-cs"/>
+                        </a:rPr>
+                        <a:t>저장</a:t>
+                      </a:r>
+                      <a:endParaRPr kumimoji="0" lang="ko-KR" altLang="en-US" sz="1100" b="0" i="0" u="none" strike="noStrike" kern="1200" cap="none" normalizeH="0" baseline="0" dirty="0" smtClean="0">
                         <a:ln>
                           <a:noFill/>
                         </a:ln>

</xml_diff>

<commit_message>
add rsa secure login (not finished)
</commit_message>
<xml_diff>
--- a/documents/자재관리시스템_보안점검 결과서.pptx
+++ b/documents/자재관리시스템_보안점검 결과서.pptx
@@ -247,7 +247,7 @@
               <a:pPr>
                 <a:defRPr/>
               </a:pPr>
-              <a:t>2017-03-19</a:t>
+              <a:t>2017-03-23</a:t>
             </a:fld>
             <a:endParaRPr lang="ko-KR" altLang="en-US"/>
           </a:p>
@@ -17585,6 +17585,35 @@
           </a:graphicData>
         </a:graphic>
       </p:graphicFrame>
+      <p:sp>
+        <p:nvSpPr>
+          <p:cNvPr id="2" name="직사각형 1"/>
+          <p:cNvSpPr/>
+          <p:nvPr/>
+        </p:nvSpPr>
+        <p:spPr>
+          <a:xfrm>
+            <a:off x="8715610" y="2708920"/>
+            <a:ext cx="2380780" cy="276999"/>
+          </a:xfrm>
+          <a:prstGeom prst="rect">
+            <a:avLst/>
+          </a:prstGeom>
+        </p:spPr>
+        <p:txBody>
+          <a:bodyPr wrap="none">
+            <a:spAutoFit/>
+          </a:bodyPr>
+          <a:lstStyle/>
+          <a:p>
+            <a:r>
+              <a:rPr lang="en-US" altLang="ko-KR" dirty="0"/>
+              <a:t>http://vip00112.tistory.com/40</a:t>
+            </a:r>
+            <a:endParaRPr lang="ko-KR" altLang="en-US" dirty="0"/>
+          </a:p>
+        </p:txBody>
+      </p:sp>
     </p:spTree>
   </p:cSld>
   <p:clrMapOvr>
@@ -21455,18 +21484,6 @@
                         </a:rPr>
                         <a:t>저장</a:t>
                       </a:r>
-                      <a:endParaRPr kumimoji="0" lang="ko-KR" altLang="en-US" sz="1100" b="0" i="0" u="none" strike="noStrike" kern="1200" cap="none" normalizeH="0" baseline="0" dirty="0" smtClean="0">
-                        <a:ln>
-                          <a:noFill/>
-                        </a:ln>
-                        <a:solidFill>
-                          <a:schemeClr val="tx1"/>
-                        </a:solidFill>
-                        <a:effectLst/>
-                        <a:latin typeface="+mn-lt"/>
-                        <a:ea typeface="+mn-ea"/>
-                        <a:cs typeface="+mn-cs"/>
-                      </a:endParaRPr>
                     </a:p>
                   </a:txBody>
                   <a:tcPr marL="91439" marR="91439" marT="45719" marB="45719" anchor="ctr" horzOverflow="overflow">

</xml_diff>

<commit_message>
transfer id/pw with RSA encryption
</commit_message>
<xml_diff>
--- a/documents/자재관리시스템_보안점검 결과서.pptx
+++ b/documents/자재관리시스템_보안점검 결과서.pptx
@@ -247,7 +247,7 @@
               <a:pPr>
                 <a:defRPr/>
               </a:pPr>
-              <a:t>2017-03-23</a:t>
+              <a:t>2017-03-26</a:t>
             </a:fld>
             <a:endParaRPr lang="ko-KR" altLang="en-US"/>
           </a:p>
@@ -12569,14 +12569,14 @@
           <p:nvPr>
             <p:extLst>
               <p:ext uri="{D42A27DB-BD31-4B8C-83A1-F6EECF244321}">
-                <p14:modId xmlns:p14="http://schemas.microsoft.com/office/powerpoint/2010/main" val="3251757893"/>
+                <p14:modId xmlns:p14="http://schemas.microsoft.com/office/powerpoint/2010/main" val="3509590354"/>
               </p:ext>
             </p:extLst>
           </p:nvPr>
         </p:nvGraphicFramePr>
         <p:xfrm>
           <a:off x="238125" y="642938"/>
-          <a:ext cx="9429750" cy="5356538"/>
+          <a:ext cx="9429750" cy="5356534"/>
         </p:xfrm>
         <a:graphic>
           <a:graphicData uri="http://schemas.openxmlformats.org/drawingml/2006/table">
@@ -14956,7 +14956,7 @@
                           <a:ea typeface="+mj-ea"/>
                           <a:cs typeface="+mn-cs"/>
                         </a:rPr>
-                        <a:t>X</a:t>
+                        <a:t>O</a:t>
                       </a:r>
                       <a:endParaRPr kumimoji="0" lang="ko-KR" altLang="en-US" sz="1100" b="0" i="0" u="none" strike="noStrike" kern="1200" cap="none" normalizeH="0" baseline="0" dirty="0" smtClean="0">
                         <a:ln>
@@ -15039,6 +15039,36 @@
                         <a:buNone/>
                         <a:tabLst/>
                       </a:pPr>
+                      <a:r>
+                        <a:rPr kumimoji="0" lang="en-US" altLang="ko-KR" sz="1100" b="0" i="0" u="none" strike="noStrike" kern="1200" cap="none" normalizeH="0" baseline="0" dirty="0" smtClean="0">
+                          <a:ln>
+                            <a:noFill/>
+                          </a:ln>
+                          <a:solidFill>
+                            <a:schemeClr val="tx1"/>
+                          </a:solidFill>
+                          <a:effectLst/>
+                          <a:latin typeface="+mn-lt"/>
+                          <a:ea typeface="+mn-ea"/>
+                          <a:cs typeface="+mn-cs"/>
+                        </a:rPr>
+                        <a:t>RSA </a:t>
+                      </a:r>
+                      <a:r>
+                        <a:rPr kumimoji="0" lang="ko-KR" altLang="en-US" sz="1100" b="0" i="0" u="none" strike="noStrike" kern="1200" cap="none" normalizeH="0" baseline="0" dirty="0" smtClean="0">
+                          <a:ln>
+                            <a:noFill/>
+                          </a:ln>
+                          <a:solidFill>
+                            <a:schemeClr val="tx1"/>
+                          </a:solidFill>
+                          <a:effectLst/>
+                          <a:latin typeface="+mn-lt"/>
+                          <a:ea typeface="+mn-ea"/>
+                          <a:cs typeface="+mn-cs"/>
+                        </a:rPr>
+                        <a:t>모듈적용</a:t>
+                      </a:r>
                       <a:endParaRPr kumimoji="0" lang="ko-KR" altLang="en-US" sz="1100" b="0" i="0" u="none" strike="noStrike" kern="1200" cap="none" normalizeH="0" baseline="0" dirty="0" smtClean="0">
                         <a:ln>
                           <a:noFill/>
@@ -15515,7 +15545,7 @@
                         <a:tabLst/>
                       </a:pPr>
                       <a:r>
-                        <a:rPr kumimoji="0" lang="ko-KR" altLang="en-US" sz="1100" b="0" i="0" u="none" strike="noStrike" kern="1200" cap="none" normalizeH="0" baseline="0" dirty="0" smtClean="0">
+                        <a:rPr kumimoji="0" lang="ko-KR" altLang="en-US" sz="1100" b="0" i="0" u="none" strike="noStrike" kern="1200" cap="none" normalizeH="0" baseline="0" dirty="0" err="1" smtClean="0">
                           <a:ln>
                             <a:noFill/>
                           </a:ln>
@@ -15527,9 +15557,9 @@
                           <a:ea typeface="+mn-ea"/>
                           <a:cs typeface="+mn-cs"/>
                         </a:rPr>
-                        <a:t>개인정보</a:t>
-                      </a:r>
-                      <a:endParaRPr kumimoji="0" lang="en-US" altLang="ko-KR" sz="1100" b="0" i="0" u="none" strike="noStrike" kern="1200" cap="none" normalizeH="0" baseline="0" dirty="0" smtClean="0">
+                        <a:t>개인정보없음</a:t>
+                      </a:r>
+                      <a:endParaRPr kumimoji="0" lang="ko-KR" altLang="en-US" sz="1100" b="0" i="0" u="none" strike="noStrike" kern="1200" cap="none" normalizeH="0" baseline="0" dirty="0" smtClean="0">
                         <a:ln>
                           <a:noFill/>
                         </a:ln>
@@ -15541,39 +15571,6 @@
                         <a:ea typeface="+mn-ea"/>
                         <a:cs typeface="+mn-cs"/>
                       </a:endParaRPr>
-                    </a:p>
-                    <a:p>
-                      <a:pPr marL="0" marR="0" lvl="0" indent="0" algn="ctr" defTabSz="914400" rtl="0" eaLnBrk="1" fontAlgn="base" latinLnBrk="1" hangingPunct="1">
-                        <a:lnSpc>
-                          <a:spcPct val="100000"/>
-                        </a:lnSpc>
-                        <a:spcBef>
-                          <a:spcPct val="20000"/>
-                        </a:spcBef>
-                        <a:spcAft>
-                          <a:spcPct val="0"/>
-                        </a:spcAft>
-                        <a:buClrTx/>
-                        <a:buSzTx/>
-                        <a:buFontTx/>
-                        <a:buNone/>
-                        <a:tabLst/>
-                      </a:pPr>
-                      <a:r>
-                        <a:rPr kumimoji="0" lang="ko-KR" altLang="en-US" sz="1100" b="0" i="0" u="none" strike="noStrike" kern="1200" cap="none" normalizeH="0" baseline="0" dirty="0" smtClean="0">
-                          <a:ln>
-                            <a:noFill/>
-                          </a:ln>
-                          <a:solidFill>
-                            <a:schemeClr val="tx1"/>
-                          </a:solidFill>
-                          <a:effectLst/>
-                          <a:latin typeface="+mn-ea"/>
-                          <a:ea typeface="+mn-ea"/>
-                          <a:cs typeface="+mn-cs"/>
-                        </a:rPr>
-                        <a:t>취급 안 함</a:t>
-                      </a:r>
                     </a:p>
                   </a:txBody>
                   <a:tcPr marL="91439" marR="91439" marT="45709" marB="45709" anchor="ctr" horzOverflow="overflow">
@@ -15870,7 +15867,7 @@
                           <a:ea typeface="+mj-ea"/>
                           <a:cs typeface="+mn-cs"/>
                         </a:rPr>
-                        <a:t>X</a:t>
+                        <a:t>NA</a:t>
                       </a:r>
                       <a:endParaRPr kumimoji="0" lang="ko-KR" altLang="en-US" sz="1100" b="0" i="0" u="none" strike="noStrike" kern="1200" cap="none" normalizeH="0" baseline="0" dirty="0" smtClean="0">
                         <a:ln>
@@ -15954,19 +15951,19 @@
                         <a:tabLst/>
                       </a:pPr>
                       <a:r>
-                        <a:rPr kumimoji="0" lang="ko-KR" altLang="en-US" sz="1100" b="0" i="0" u="none" strike="noStrike" kern="1200" cap="none" normalizeH="0" baseline="0" dirty="0" err="1" smtClean="0">
-                          <a:ln>
-                            <a:noFill/>
-                          </a:ln>
-                          <a:solidFill>
-                            <a:schemeClr val="tx1"/>
-                          </a:solidFill>
-                          <a:effectLst/>
-                          <a:latin typeface="+mj-lt"/>
-                          <a:ea typeface="+mj-ea"/>
-                          <a:cs typeface="+mn-cs"/>
-                        </a:rPr>
-                        <a:t>필요없음</a:t>
+                        <a:rPr kumimoji="0" lang="ko-KR" altLang="en-US" sz="1100" b="0" i="0" u="none" strike="noStrike" kern="1200" cap="none" normalizeH="0" baseline="0" dirty="0" smtClean="0">
+                          <a:ln>
+                            <a:noFill/>
+                          </a:ln>
+                          <a:solidFill>
+                            <a:schemeClr val="tx1"/>
+                          </a:solidFill>
+                          <a:effectLst/>
+                          <a:latin typeface="+mj-lt"/>
+                          <a:ea typeface="+mj-ea"/>
+                          <a:cs typeface="+mn-cs"/>
+                        </a:rPr>
+                        <a:t>쿠키 미사용</a:t>
                       </a:r>
                       <a:endParaRPr kumimoji="0" lang="ko-KR" altLang="en-US" sz="1100" b="0" i="0" u="none" strike="noStrike" kern="1200" cap="none" normalizeH="0" baseline="0" dirty="0" smtClean="0">
                         <a:ln>
@@ -17585,35 +17582,6 @@
           </a:graphicData>
         </a:graphic>
       </p:graphicFrame>
-      <p:sp>
-        <p:nvSpPr>
-          <p:cNvPr id="2" name="직사각형 1"/>
-          <p:cNvSpPr/>
-          <p:nvPr/>
-        </p:nvSpPr>
-        <p:spPr>
-          <a:xfrm>
-            <a:off x="8715610" y="2708920"/>
-            <a:ext cx="2380780" cy="276999"/>
-          </a:xfrm>
-          <a:prstGeom prst="rect">
-            <a:avLst/>
-          </a:prstGeom>
-        </p:spPr>
-        <p:txBody>
-          <a:bodyPr wrap="none">
-            <a:spAutoFit/>
-          </a:bodyPr>
-          <a:lstStyle/>
-          <a:p>
-            <a:r>
-              <a:rPr lang="en-US" altLang="ko-KR" dirty="0"/>
-              <a:t>http://vip00112.tistory.com/40</a:t>
-            </a:r>
-            <a:endParaRPr lang="ko-KR" altLang="en-US" dirty="0"/>
-          </a:p>
-        </p:txBody>
-      </p:sp>
     </p:spTree>
   </p:cSld>
   <p:clrMapOvr>
@@ -17834,7 +17802,7 @@
           <p:nvPr>
             <p:extLst>
               <p:ext uri="{D42A27DB-BD31-4B8C-83A1-F6EECF244321}">
-                <p14:modId xmlns:p14="http://schemas.microsoft.com/office/powerpoint/2010/main" val="2457269692"/>
+                <p14:modId xmlns:p14="http://schemas.microsoft.com/office/powerpoint/2010/main" val="2673299382"/>
               </p:ext>
             </p:extLst>
           </p:nvPr>
@@ -18777,7 +18745,7 @@
                           <a:ea typeface="+mn-ea"/>
                           <a:cs typeface="+mn-cs"/>
                         </a:rPr>
-                        <a:t>N/A</a:t>
+                        <a:t>O</a:t>
                       </a:r>
                       <a:endParaRPr lang="ko-KR" altLang="ko-KR" sz="1100" kern="1200" dirty="0" smtClean="0">
                         <a:solidFill>
@@ -18856,21 +18824,6 @@
                         <a:buNone/>
                         <a:tabLst/>
                       </a:pPr>
-                      <a:r>
-                        <a:rPr kumimoji="0" lang="ko-KR" altLang="en-US" sz="1100" b="0" i="0" u="none" strike="noStrike" kern="1200" cap="none" normalizeH="0" baseline="0" dirty="0" err="1" smtClean="0">
-                          <a:ln>
-                            <a:noFill/>
-                          </a:ln>
-                          <a:solidFill>
-                            <a:schemeClr val="tx1"/>
-                          </a:solidFill>
-                          <a:effectLst/>
-                          <a:latin typeface="+mj-lt"/>
-                          <a:ea typeface="+mj-ea"/>
-                          <a:cs typeface="+mn-cs"/>
-                        </a:rPr>
-                        <a:t>필요없음</a:t>
-                      </a:r>
                       <a:endParaRPr kumimoji="0" lang="ko-KR" altLang="en-US" sz="1100" b="0" i="0" u="none" strike="noStrike" kern="1200" cap="none" normalizeH="0" baseline="0" dirty="0" smtClean="0">
                         <a:ln>
                           <a:noFill/>

</xml_diff>

<commit_message>
block mouse right click
</commit_message>
<xml_diff>
--- a/documents/자재관리시스템_보안점검 결과서.pptx
+++ b/documents/자재관리시스템_보안점검 결과서.pptx
@@ -12569,7 +12569,7 @@
           <p:nvPr>
             <p:extLst>
               <p:ext uri="{D42A27DB-BD31-4B8C-83A1-F6EECF244321}">
-                <p14:modId xmlns:p14="http://schemas.microsoft.com/office/powerpoint/2010/main" val="3509590354"/>
+                <p14:modId xmlns:p14="http://schemas.microsoft.com/office/powerpoint/2010/main" val="3162380062"/>
               </p:ext>
             </p:extLst>
           </p:nvPr>
@@ -15069,18 +15069,6 @@
                         </a:rPr>
                         <a:t>모듈적용</a:t>
                       </a:r>
-                      <a:endParaRPr kumimoji="0" lang="ko-KR" altLang="en-US" sz="1100" b="0" i="0" u="none" strike="noStrike" kern="1200" cap="none" normalizeH="0" baseline="0" dirty="0" smtClean="0">
-                        <a:ln>
-                          <a:noFill/>
-                        </a:ln>
-                        <a:solidFill>
-                          <a:schemeClr val="tx1"/>
-                        </a:solidFill>
-                        <a:effectLst/>
-                        <a:latin typeface="+mn-lt"/>
-                        <a:ea typeface="+mn-ea"/>
-                        <a:cs typeface="+mn-cs"/>
-                      </a:endParaRPr>
                     </a:p>
                   </a:txBody>
                   <a:tcPr marL="91439" marR="91439" marT="45709" marB="45709" anchor="ctr" horzOverflow="overflow">
@@ -15934,7 +15922,7 @@
                     <a:bodyPr/>
                     <a:lstStyle/>
                     <a:p>
-                      <a:pPr marL="0" marR="0" lvl="0" indent="0" algn="l" defTabSz="914400" rtl="0" eaLnBrk="1" fontAlgn="base" latinLnBrk="1" hangingPunct="1">
+                      <a:pPr marL="0" marR="0" lvl="0" indent="0" algn="ctr" defTabSz="914400" rtl="0" eaLnBrk="1" fontAlgn="base" latinLnBrk="1" hangingPunct="1">
                         <a:lnSpc>
                           <a:spcPct val="100000"/>
                         </a:lnSpc>
@@ -15963,20 +15951,23 @@
                           <a:ea typeface="+mj-ea"/>
                           <a:cs typeface="+mn-cs"/>
                         </a:rPr>
-                        <a:t>쿠키 미사용</a:t>
-                      </a:r>
-                      <a:endParaRPr kumimoji="0" lang="ko-KR" altLang="en-US" sz="1100" b="0" i="0" u="none" strike="noStrike" kern="1200" cap="none" normalizeH="0" baseline="0" dirty="0" smtClean="0">
-                        <a:ln>
-                          <a:noFill/>
-                        </a:ln>
-                        <a:solidFill>
-                          <a:schemeClr val="tx1"/>
-                        </a:solidFill>
-                        <a:effectLst/>
-                        <a:latin typeface="+mj-lt"/>
-                        <a:ea typeface="+mj-ea"/>
-                        <a:cs typeface="+mn-cs"/>
-                      </a:endParaRPr>
+                        <a:t>쿠키 </a:t>
+                      </a:r>
+                      <a:r>
+                        <a:rPr kumimoji="0" lang="ko-KR" altLang="en-US" sz="1100" b="0" i="0" u="none" strike="noStrike" kern="1200" cap="none" normalizeH="0" baseline="0" dirty="0" smtClean="0">
+                          <a:ln>
+                            <a:noFill/>
+                          </a:ln>
+                          <a:solidFill>
+                            <a:schemeClr val="tx1"/>
+                          </a:solidFill>
+                          <a:effectLst/>
+                          <a:latin typeface="+mj-lt"/>
+                          <a:ea typeface="+mj-ea"/>
+                          <a:cs typeface="+mn-cs"/>
+                        </a:rPr>
+                        <a:t>미사용</a:t>
+                      </a:r>
                     </a:p>
                   </a:txBody>
                   <a:tcPr marL="91439" marR="91439" marT="45709" marB="45709" anchor="ctr" horzOverflow="overflow">
@@ -17802,7 +17793,7 @@
           <p:nvPr>
             <p:extLst>
               <p:ext uri="{D42A27DB-BD31-4B8C-83A1-F6EECF244321}">
-                <p14:modId xmlns:p14="http://schemas.microsoft.com/office/powerpoint/2010/main" val="2673299382"/>
+                <p14:modId xmlns:p14="http://schemas.microsoft.com/office/powerpoint/2010/main" val="2572706301"/>
               </p:ext>
             </p:extLst>
           </p:nvPr>
@@ -19248,7 +19239,7 @@
                           <a:ea typeface="+mn-ea"/>
                           <a:cs typeface="+mn-cs"/>
                         </a:rPr>
-                        <a:t>X</a:t>
+                        <a:t>O</a:t>
                       </a:r>
                       <a:endParaRPr lang="ko-KR" altLang="ko-KR" sz="1100" kern="1200" dirty="0" smtClean="0">
                         <a:solidFill>
@@ -19340,7 +19331,22 @@
                           <a:ea typeface="+mj-ea"/>
                           <a:cs typeface="+mn-cs"/>
                         </a:rPr>
-                        <a:t>필요없음</a:t>
+                        <a:t>우클릭</a:t>
+                      </a:r>
+                      <a:r>
+                        <a:rPr kumimoji="0" lang="ko-KR" altLang="en-US" sz="1100" b="0" i="0" u="none" strike="noStrike" kern="1200" cap="none" normalizeH="0" baseline="0" dirty="0" smtClean="0">
+                          <a:ln>
+                            <a:noFill/>
+                          </a:ln>
+                          <a:solidFill>
+                            <a:schemeClr val="tx1"/>
+                          </a:solidFill>
+                          <a:effectLst/>
+                          <a:latin typeface="+mj-lt"/>
+                          <a:ea typeface="+mj-ea"/>
+                          <a:cs typeface="+mn-cs"/>
+                        </a:rPr>
+                        <a:t> 금지</a:t>
                       </a:r>
                       <a:endParaRPr kumimoji="0" lang="ko-KR" altLang="en-US" sz="1100" b="0" i="0" u="none" strike="noStrike" kern="1200" cap="none" normalizeH="0" baseline="0" dirty="0" smtClean="0">
                         <a:ln>
@@ -21706,7 +21712,7 @@
           <p:nvPr>
             <p:extLst>
               <p:ext uri="{D42A27DB-BD31-4B8C-83A1-F6EECF244321}">
-                <p14:modId xmlns:p14="http://schemas.microsoft.com/office/powerpoint/2010/main" val="1589815455"/>
+                <p14:modId xmlns:p14="http://schemas.microsoft.com/office/powerpoint/2010/main" val="3499036315"/>
               </p:ext>
             </p:extLst>
           </p:nvPr>
@@ -22928,17 +22934,6 @@
                         <a:tabLst/>
                         <a:defRPr/>
                       </a:pPr>
-                      <a:r>
-                        <a:rPr lang="ko-KR" altLang="en-US" sz="1100" kern="1200" dirty="0" smtClean="0">
-                          <a:solidFill>
-                            <a:schemeClr val="tx1"/>
-                          </a:solidFill>
-                          <a:latin typeface="+mn-lt"/>
-                          <a:ea typeface="+mn-ea"/>
-                          <a:cs typeface="+mn-cs"/>
-                        </a:rPr>
-                        <a:t>불필요</a:t>
-                      </a:r>
                       <a:endParaRPr lang="en-US" altLang="ko-KR" sz="1100" kern="1200" dirty="0" smtClean="0">
                         <a:solidFill>
                           <a:schemeClr val="tx1"/>
@@ -23298,7 +23293,7 @@
                           <a:ea typeface="+mj-ea"/>
                           <a:cs typeface="+mn-cs"/>
                         </a:rPr>
-                        <a:t>X</a:t>
+                        <a:t>NA</a:t>
                       </a:r>
                       <a:endParaRPr lang="ko-KR" altLang="ko-KR" sz="1100" kern="1200" dirty="0" smtClean="0">
                         <a:solidFill>
@@ -23947,20 +23942,6 @@
                     <a:bodyPr/>
                     <a:lstStyle/>
                     <a:p>
-                      <a:r>
-                        <a:rPr lang="en-US" altLang="ko-KR" sz="1100" dirty="0" smtClean="0">
-                          <a:latin typeface="+mj-lt"/>
-                          <a:ea typeface="+mj-ea"/>
-                        </a:rPr>
-                        <a:t>Framework</a:t>
-                      </a:r>
-                      <a:r>
-                        <a:rPr lang="ko-KR" altLang="en-US" sz="1100" dirty="0" smtClean="0">
-                          <a:latin typeface="+mj-lt"/>
-                          <a:ea typeface="+mj-ea"/>
-                        </a:rPr>
-                        <a:t>에서 차단</a:t>
-                      </a:r>
                       <a:endParaRPr lang="ko-KR" altLang="en-US" sz="1100" dirty="0">
                         <a:latin typeface="+mj-lt"/>
                         <a:ea typeface="+mj-ea"/>
@@ -24517,7 +24498,7 @@
                           <a:ea typeface="+mj-ea"/>
                           <a:cs typeface="+mn-cs"/>
                         </a:rPr>
-                        <a:t>N/A</a:t>
+                        <a:t>O</a:t>
                       </a:r>
                       <a:endParaRPr kumimoji="0" lang="ko-KR" altLang="en-US" sz="1100" b="0" i="0" u="none" strike="noStrike" kern="1200" cap="none" normalizeH="0" baseline="0" dirty="0" smtClean="0">
                         <a:ln>
@@ -24601,20 +24582,75 @@
                         <a:tabLst/>
                       </a:pPr>
                       <a:r>
-                        <a:rPr kumimoji="0" lang="ko-KR" altLang="en-US" sz="1100" b="0" i="0" u="none" strike="noStrike" kern="1200" cap="none" normalizeH="0" baseline="0" dirty="0" smtClean="0">
-                          <a:ln>
-                            <a:noFill/>
-                          </a:ln>
-                          <a:solidFill>
-                            <a:schemeClr val="tx1"/>
-                          </a:solidFill>
-                          <a:effectLst/>
-                          <a:latin typeface="+mj-lt"/>
-                          <a:ea typeface="+mj-ea"/>
-                          <a:cs typeface="+mn-cs"/>
-                        </a:rPr>
-                        <a:t>파일업로드는 필요기능</a:t>
-                      </a:r>
+                        <a:rPr lang="ko-KR" altLang="en-US" sz="1100" kern="1200" dirty="0" smtClean="0">
+                          <a:solidFill>
+                            <a:schemeClr val="tx1"/>
+                          </a:solidFill>
+                          <a:latin typeface="+mn-lt"/>
+                          <a:ea typeface="+mn-ea"/>
+                          <a:cs typeface="+mn-cs"/>
+                        </a:rPr>
+                        <a:t>엑셀파일만 통과</a:t>
+                      </a:r>
+                      <a:r>
+                        <a:rPr lang="en-US" altLang="ko-KR" sz="1100" kern="1200" dirty="0" smtClean="0">
+                          <a:solidFill>
+                            <a:schemeClr val="tx1"/>
+                          </a:solidFill>
+                          <a:latin typeface="+mn-lt"/>
+                          <a:ea typeface="+mn-ea"/>
+                          <a:cs typeface="+mn-cs"/>
+                        </a:rPr>
+                        <a:t>.</a:t>
+                      </a:r>
+                    </a:p>
+                    <a:p>
+                      <a:pPr marL="0" marR="0" lvl="0" indent="0" algn="l" defTabSz="914400" rtl="0" eaLnBrk="1" fontAlgn="base" latinLnBrk="1" hangingPunct="1">
+                        <a:lnSpc>
+                          <a:spcPct val="100000"/>
+                        </a:lnSpc>
+                        <a:spcBef>
+                          <a:spcPct val="20000"/>
+                        </a:spcBef>
+                        <a:spcAft>
+                          <a:spcPct val="0"/>
+                        </a:spcAft>
+                        <a:buClrTx/>
+                        <a:buSzTx/>
+                        <a:buFontTx/>
+                        <a:buNone/>
+                        <a:tabLst/>
+                      </a:pPr>
+                      <a:r>
+                        <a:rPr lang="ko-KR" altLang="en-US" sz="1100" kern="1200" dirty="0" err="1" smtClean="0">
+                          <a:solidFill>
+                            <a:schemeClr val="tx1"/>
+                          </a:solidFill>
+                          <a:latin typeface="+mn-lt"/>
+                          <a:ea typeface="+mn-ea"/>
+                          <a:cs typeface="+mn-cs"/>
+                        </a:rPr>
+                        <a:t>파싱실패시</a:t>
+                      </a:r>
+                      <a:r>
+                        <a:rPr lang="ko-KR" altLang="en-US" sz="1100" kern="1200" dirty="0" smtClean="0">
+                          <a:solidFill>
+                            <a:schemeClr val="tx1"/>
+                          </a:solidFill>
+                          <a:latin typeface="+mn-lt"/>
+                          <a:ea typeface="+mn-ea"/>
+                          <a:cs typeface="+mn-cs"/>
+                        </a:rPr>
+                        <a:t> 에러페이지 이동</a:t>
+                      </a:r>
+                      <a:endParaRPr lang="ko-KR" altLang="en-US" sz="1100" kern="1200" dirty="0" smtClean="0">
+                        <a:solidFill>
+                          <a:schemeClr val="tx1"/>
+                        </a:solidFill>
+                        <a:latin typeface="+mn-lt"/>
+                        <a:ea typeface="+mn-ea"/>
+                        <a:cs typeface="+mn-cs"/>
+                      </a:endParaRPr>
                     </a:p>
                   </a:txBody>
                   <a:tcPr marL="91439" marR="91439" marT="45725" marB="45725" anchor="ctr" horzOverflow="overflow">
@@ -25046,7 +25082,7 @@
                           <a:ea typeface="+mn-ea"/>
                           <a:cs typeface="+mn-cs"/>
                         </a:rPr>
-                        <a:t>N/A</a:t>
+                        <a:t>O</a:t>
                       </a:r>
                       <a:endParaRPr kumimoji="0" lang="ko-KR" altLang="en-US" sz="1100" b="0" i="0" u="none" strike="noStrike" kern="1200" cap="none" normalizeH="0" baseline="0" dirty="0" smtClean="0">
                         <a:ln>
@@ -25130,19 +25166,26 @@
                         <a:tabLst/>
                       </a:pPr>
                       <a:r>
-                        <a:rPr kumimoji="0" lang="ko-KR" altLang="en-US" sz="1100" b="0" i="0" u="none" strike="noStrike" kern="1200" cap="none" normalizeH="0" baseline="0" dirty="0" smtClean="0">
-                          <a:ln>
-                            <a:noFill/>
-                          </a:ln>
-                          <a:solidFill>
-                            <a:schemeClr val="tx1"/>
-                          </a:solidFill>
-                          <a:effectLst/>
-                          <a:latin typeface="+mn-lt"/>
-                          <a:ea typeface="+mn-ea"/>
-                          <a:cs typeface="+mn-cs"/>
-                        </a:rPr>
-                        <a:t>파일다운로드는 필요기능</a:t>
+                        <a:rPr lang="ko-KR" altLang="en-US" sz="1100" kern="1200" dirty="0" err="1" smtClean="0">
+                          <a:solidFill>
+                            <a:schemeClr val="tx1"/>
+                          </a:solidFill>
+                          <a:latin typeface="+mj-lt"/>
+                          <a:ea typeface="+mj-ea"/>
+                          <a:cs typeface="+mn-cs"/>
+                        </a:rPr>
+                        <a:t>인자입력받지</a:t>
+                      </a:r>
+                      <a:r>
+                        <a:rPr lang="ko-KR" altLang="en-US" sz="1100" kern="1200" dirty="0" smtClean="0">
+                          <a:solidFill>
+                            <a:schemeClr val="tx1"/>
+                          </a:solidFill>
+                          <a:latin typeface="+mj-lt"/>
+                          <a:ea typeface="+mj-ea"/>
+                          <a:cs typeface="+mn-cs"/>
+                        </a:rPr>
+                        <a:t> 않음</a:t>
                       </a:r>
                       <a:endParaRPr lang="ko-KR" altLang="en-US" sz="1100" kern="1200" dirty="0" smtClean="0">
                         <a:solidFill>
@@ -25246,7 +25289,7 @@
           <p:nvPr>
             <p:extLst>
               <p:ext uri="{D42A27DB-BD31-4B8C-83A1-F6EECF244321}">
-                <p14:modId xmlns:p14="http://schemas.microsoft.com/office/powerpoint/2010/main" val="1279651210"/>
+                <p14:modId xmlns:p14="http://schemas.microsoft.com/office/powerpoint/2010/main" val="1590753644"/>
               </p:ext>
             </p:extLst>
           </p:nvPr>
@@ -27349,7 +27392,7 @@
                           <a:ea typeface="+mj-ea"/>
                           <a:cs typeface="+mn-cs"/>
                         </a:rPr>
-                        <a:t>N/A</a:t>
+                        <a:t>O</a:t>
                       </a:r>
                       <a:endParaRPr kumimoji="0" lang="ko-KR" altLang="en-US" sz="1100" b="0" i="0" u="none" strike="noStrike" kern="1200" cap="none" normalizeH="0" baseline="0" dirty="0" smtClean="0">
                         <a:ln>
@@ -27432,21 +27475,18 @@
                         <a:buNone/>
                         <a:tabLst/>
                       </a:pPr>
-                      <a:r>
-                        <a:rPr kumimoji="0" lang="ko-KR" altLang="en-US" sz="1100" b="0" i="0" u="none" strike="noStrike" kern="1200" cap="none" normalizeH="0" baseline="0" dirty="0" smtClean="0">
-                          <a:ln>
-                            <a:noFill/>
-                          </a:ln>
-                          <a:solidFill>
-                            <a:schemeClr val="tx1"/>
-                          </a:solidFill>
-                          <a:effectLst/>
-                          <a:latin typeface="+mj-lt"/>
-                          <a:ea typeface="+mj-ea"/>
-                          <a:cs typeface="+mn-cs"/>
-                        </a:rPr>
-                        <a:t>중요정보 없음</a:t>
-                      </a:r>
+                      <a:endParaRPr kumimoji="0" lang="ko-KR" altLang="en-US" sz="1100" b="0" i="0" u="none" strike="noStrike" kern="1200" cap="none" normalizeH="0" baseline="0" dirty="0" smtClean="0">
+                        <a:ln>
+                          <a:noFill/>
+                        </a:ln>
+                        <a:solidFill>
+                          <a:schemeClr val="tx1"/>
+                        </a:solidFill>
+                        <a:effectLst/>
+                        <a:latin typeface="+mj-lt"/>
+                        <a:ea typeface="+mj-ea"/>
+                        <a:cs typeface="+mn-cs"/>
+                      </a:endParaRPr>
                     </a:p>
                   </a:txBody>
                   <a:tcPr marL="91439" marR="91439" marT="45719" marB="45719" anchor="ctr" horzOverflow="overflow">
@@ -27920,7 +27960,7 @@
                           <a:ea typeface="+mj-ea"/>
                           <a:cs typeface="+mn-cs"/>
                         </a:rPr>
-                        <a:t>N/A</a:t>
+                        <a:t>O</a:t>
                       </a:r>
                       <a:endParaRPr kumimoji="0" lang="ko-KR" altLang="en-US" sz="1100" b="0" i="0" u="none" strike="noStrike" kern="1200" cap="none" normalizeH="0" baseline="0" dirty="0" smtClean="0">
                         <a:ln>
@@ -28016,8 +28056,80 @@
                           <a:ea typeface="+mj-ea"/>
                           <a:cs typeface="+mn-cs"/>
                         </a:rPr>
-                        <a:t>중요정보 없음</a:t>
-                      </a:r>
+                        <a:t>로그인시 사용되는 키는 </a:t>
+                      </a:r>
+                      <a:r>
+                        <a:rPr kumimoji="0" lang="en-US" altLang="ko-KR" sz="1100" b="0" i="0" u="none" strike="noStrike" kern="1200" cap="none" normalizeH="0" baseline="0" dirty="0" smtClean="0">
+                          <a:ln>
+                            <a:noFill/>
+                          </a:ln>
+                          <a:solidFill>
+                            <a:schemeClr val="tx1"/>
+                          </a:solidFill>
+                          <a:effectLst/>
+                          <a:latin typeface="+mj-lt"/>
+                          <a:ea typeface="+mj-ea"/>
+                          <a:cs typeface="+mn-cs"/>
+                        </a:rPr>
+                        <a:t>1</a:t>
+                      </a:r>
+                      <a:r>
+                        <a:rPr kumimoji="0" lang="ko-KR" altLang="en-US" sz="1100" b="0" i="0" u="none" strike="noStrike" kern="1200" cap="none" normalizeH="0" baseline="0" dirty="0" smtClean="0">
+                          <a:ln>
+                            <a:noFill/>
+                          </a:ln>
+                          <a:solidFill>
+                            <a:schemeClr val="tx1"/>
+                          </a:solidFill>
+                          <a:effectLst/>
+                          <a:latin typeface="+mj-lt"/>
+                          <a:ea typeface="+mj-ea"/>
+                          <a:cs typeface="+mn-cs"/>
+                        </a:rPr>
+                        <a:t>회용으로 </a:t>
+                      </a:r>
+                      <a:r>
+                        <a:rPr kumimoji="0" lang="ko-KR" altLang="en-US" sz="1100" b="0" i="0" u="none" strike="noStrike" kern="1200" cap="none" normalizeH="0" baseline="0" dirty="0" err="1" smtClean="0">
+                          <a:ln>
+                            <a:noFill/>
+                          </a:ln>
+                          <a:solidFill>
+                            <a:schemeClr val="tx1"/>
+                          </a:solidFill>
+                          <a:effectLst/>
+                          <a:latin typeface="+mj-lt"/>
+                          <a:ea typeface="+mj-ea"/>
+                          <a:cs typeface="+mn-cs"/>
+                        </a:rPr>
+                        <a:t>로그인처리중에</a:t>
+                      </a:r>
+                      <a:r>
+                        <a:rPr kumimoji="0" lang="ko-KR" altLang="en-US" sz="1100" b="0" i="0" u="none" strike="noStrike" kern="1200" cap="none" normalizeH="0" baseline="0" dirty="0" smtClean="0">
+                          <a:ln>
+                            <a:noFill/>
+                          </a:ln>
+                          <a:solidFill>
+                            <a:schemeClr val="tx1"/>
+                          </a:solidFill>
+                          <a:effectLst/>
+                          <a:latin typeface="+mj-lt"/>
+                          <a:ea typeface="+mj-ea"/>
+                          <a:cs typeface="+mn-cs"/>
+                        </a:rPr>
+                        <a:t> 삭제함</a:t>
+                      </a:r>
+                      <a:endParaRPr kumimoji="0" lang="ko-KR" altLang="en-US" sz="1100" b="0" i="0" u="none" strike="noStrike" kern="1200" cap="none" normalizeH="0" baseline="0" dirty="0" smtClean="0">
+                        <a:ln>
+                          <a:noFill/>
+                        </a:ln>
+                        <a:solidFill>
+                          <a:schemeClr val="tx1"/>
+                        </a:solidFill>
+                        <a:effectLst/>
+                        <a:latin typeface="+mj-lt"/>
+                        <a:ea typeface="+mj-ea"/>
+                        <a:cs typeface="+mn-cs"/>
+                      </a:endParaRPr>
                     </a:p>
                   </a:txBody>
                   <a:tcPr marL="91439" marR="91439" marT="45719" marB="45719" anchor="ctr" horzOverflow="overflow">
@@ -28881,7 +28993,7 @@
           <p:nvPr>
             <p:extLst>
               <p:ext uri="{D42A27DB-BD31-4B8C-83A1-F6EECF244321}">
-                <p14:modId xmlns:p14="http://schemas.microsoft.com/office/powerpoint/2010/main" val="633404495"/>
+                <p14:modId xmlns:p14="http://schemas.microsoft.com/office/powerpoint/2010/main" val="924896760"/>
               </p:ext>
             </p:extLst>
           </p:nvPr>
@@ -30499,7 +30611,7 @@
                           <a:ea typeface="+mj-ea"/>
                           <a:cs typeface="+mn-cs"/>
                         </a:rPr>
-                        <a:t>N/A</a:t>
+                        <a:t>O</a:t>
                       </a:r>
                       <a:endParaRPr lang="ko-KR" altLang="en-US" sz="1100" kern="1200" dirty="0" smtClean="0">
                         <a:solidFill>
@@ -30579,7 +30691,7 @@
                         <a:tabLst/>
                       </a:pPr>
                       <a:r>
-                        <a:rPr lang="ko-KR" altLang="en-US" sz="1100" kern="1200" dirty="0" err="1" smtClean="0">
+                        <a:rPr lang="en-US" altLang="ko-KR" sz="1100" kern="1200" dirty="0" smtClean="0">
                           <a:solidFill>
                             <a:schemeClr val="tx1"/>
                           </a:solidFill>
@@ -30587,7 +30699,55 @@
                           <a:ea typeface="+mn-ea"/>
                           <a:cs typeface="+mn-cs"/>
                         </a:rPr>
-                        <a:t>해당없음</a:t>
+                        <a:t>Logout</a:t>
+                      </a:r>
+                      <a:r>
+                        <a:rPr lang="ko-KR" altLang="en-US" sz="1100" kern="1200" dirty="0" smtClean="0">
+                          <a:solidFill>
+                            <a:schemeClr val="tx1"/>
+                          </a:solidFill>
+                          <a:latin typeface="+mn-lt"/>
+                          <a:ea typeface="+mn-ea"/>
+                          <a:cs typeface="+mn-cs"/>
+                        </a:rPr>
+                        <a:t>시 세션정리</a:t>
+                      </a:r>
+                      <a:endParaRPr lang="en-US" altLang="ko-KR" sz="1100" kern="1200" dirty="0" smtClean="0">
+                        <a:solidFill>
+                          <a:schemeClr val="tx1"/>
+                        </a:solidFill>
+                        <a:latin typeface="+mn-lt"/>
+                        <a:ea typeface="+mn-ea"/>
+                        <a:cs typeface="+mn-cs"/>
+                      </a:endParaRPr>
+                    </a:p>
+                    <a:p>
+                      <a:pPr marL="0" marR="0" lvl="0" indent="0" algn="l" defTabSz="914400" rtl="0" eaLnBrk="1" fontAlgn="base" latinLnBrk="1" hangingPunct="1">
+                        <a:lnSpc>
+                          <a:spcPct val="100000"/>
+                        </a:lnSpc>
+                        <a:spcBef>
+                          <a:spcPct val="20000"/>
+                        </a:spcBef>
+                        <a:spcAft>
+                          <a:spcPct val="0"/>
+                        </a:spcAft>
+                        <a:buClrTx/>
+                        <a:buSzTx/>
+                        <a:buFontTx/>
+                        <a:buNone/>
+                        <a:tabLst/>
+                      </a:pPr>
+                      <a:r>
+                        <a:rPr lang="ko-KR" altLang="en-US" sz="1100" kern="1200" dirty="0" smtClean="0">
+                          <a:solidFill>
+                            <a:schemeClr val="tx1"/>
+                          </a:solidFill>
+                          <a:latin typeface="+mn-lt"/>
+                          <a:ea typeface="+mn-ea"/>
+                          <a:cs typeface="+mn-cs"/>
+                        </a:rPr>
+                        <a:t>쿠키 미사용</a:t>
                       </a:r>
                       <a:endParaRPr lang="ko-KR" altLang="en-US" sz="1100" kern="1200" dirty="0" smtClean="0">
                         <a:solidFill>
@@ -31078,7 +31238,7 @@
                           <a:ea typeface="+mj-ea"/>
                           <a:cs typeface="+mn-cs"/>
                         </a:rPr>
-                        <a:t>N/A</a:t>
+                        <a:t>O</a:t>
                       </a:r>
                       <a:endParaRPr lang="ko-KR" altLang="en-US" sz="1100" kern="1200" dirty="0" smtClean="0">
                         <a:solidFill>
@@ -31158,15 +31318,37 @@
                         <a:tabLst/>
                       </a:pPr>
                       <a:r>
-                        <a:rPr lang="ko-KR" altLang="en-US" sz="1100" kern="1200" dirty="0" err="1" smtClean="0">
-                          <a:solidFill>
-                            <a:schemeClr val="tx1"/>
-                          </a:solidFill>
-                          <a:latin typeface="+mj-lt"/>
-                          <a:ea typeface="+mj-ea"/>
-                          <a:cs typeface="+mn-cs"/>
-                        </a:rPr>
-                        <a:t>해당없음</a:t>
+                        <a:rPr lang="en-US" altLang="ko-KR" sz="1100" kern="1200" dirty="0" smtClean="0">
+                          <a:solidFill>
+                            <a:schemeClr val="tx1"/>
+                          </a:solidFill>
+                          <a:latin typeface="+mj-lt"/>
+                          <a:ea typeface="+mj-ea"/>
+                          <a:cs typeface="+mn-cs"/>
+                        </a:rPr>
+                        <a:t>Login </a:t>
+                      </a:r>
+                      <a:r>
+                        <a:rPr lang="ko-KR" altLang="en-US" sz="1100" kern="1200" dirty="0" smtClean="0">
+                          <a:solidFill>
+                            <a:schemeClr val="tx1"/>
+                          </a:solidFill>
+                          <a:latin typeface="+mj-lt"/>
+                          <a:ea typeface="+mj-ea"/>
+                          <a:cs typeface="+mn-cs"/>
+                        </a:rPr>
+                        <a:t>세션</a:t>
+                      </a:r>
+                      <a:r>
+                        <a:rPr lang="ko-KR" altLang="en-US" sz="1100" kern="1200" baseline="0" dirty="0" smtClean="0">
+                          <a:solidFill>
+                            <a:schemeClr val="tx1"/>
+                          </a:solidFill>
+                          <a:latin typeface="+mj-lt"/>
+                          <a:ea typeface="+mj-ea"/>
+                          <a:cs typeface="+mn-cs"/>
+                        </a:rPr>
+                        <a:t>정보를 확인함</a:t>
                       </a:r>
                       <a:endParaRPr lang="ko-KR" altLang="en-US" sz="1100" kern="1200" dirty="0" smtClean="0">
                         <a:solidFill>

</xml_diff>

<commit_message>
change pasword in DB to SHA256 hash data
</commit_message>
<xml_diff>
--- a/documents/자재관리시스템_보안점검 결과서.pptx
+++ b/documents/자재관리시스템_보안점검 결과서.pptx
@@ -12569,7 +12569,7 @@
           <p:nvPr>
             <p:extLst>
               <p:ext uri="{D42A27DB-BD31-4B8C-83A1-F6EECF244321}">
-                <p14:modId xmlns:p14="http://schemas.microsoft.com/office/powerpoint/2010/main" val="3162380062"/>
+                <p14:modId xmlns:p14="http://schemas.microsoft.com/office/powerpoint/2010/main" val="2734637776"/>
               </p:ext>
             </p:extLst>
           </p:nvPr>
@@ -14391,7 +14391,7 @@
                           <a:ea typeface="+mj-ea"/>
                           <a:cs typeface="+mn-cs"/>
                         </a:rPr>
-                        <a:t>X</a:t>
+                        <a:t>O</a:t>
                       </a:r>
                       <a:endParaRPr kumimoji="0" lang="ko-KR" altLang="en-US" sz="1100" b="0" i="0" u="none" strike="noStrike" kern="1200" cap="none" normalizeH="0" baseline="0" dirty="0" smtClean="0">
                         <a:ln>
@@ -14474,6 +14474,21 @@
                         <a:buNone/>
                         <a:tabLst/>
                       </a:pPr>
+                      <a:r>
+                        <a:rPr kumimoji="0" lang="en-US" altLang="ko-KR" sz="1100" b="0" i="0" u="none" strike="noStrike" kern="1200" cap="none" normalizeH="0" baseline="0" smtClean="0">
+                          <a:ln>
+                            <a:noFill/>
+                          </a:ln>
+                          <a:solidFill>
+                            <a:schemeClr val="tx1"/>
+                          </a:solidFill>
+                          <a:effectLst/>
+                          <a:latin typeface="+mj-lt"/>
+                          <a:ea typeface="+mj-ea"/>
+                          <a:cs typeface="+mn-cs"/>
+                        </a:rPr>
+                        <a:t>SHA256</a:t>
+                      </a:r>
                       <a:endParaRPr kumimoji="0" lang="ko-KR" altLang="en-US" sz="1100" b="0" i="0" u="none" strike="noStrike" kern="1200" cap="none" normalizeH="0" baseline="0" dirty="0" smtClean="0">
                         <a:ln>
                           <a:noFill/>

</xml_diff>

<commit_message>
can not use < > ( ) # & for search keyword
</commit_message>
<xml_diff>
--- a/documents/자재관리시스템_보안점검 결과서.pptx
+++ b/documents/자재관리시스템_보안점검 결과서.pptx
@@ -21700,7 +21700,7 @@
           <p:nvPr>
             <p:extLst>
               <p:ext uri="{D42A27DB-BD31-4B8C-83A1-F6EECF244321}">
-                <p14:modId xmlns:p14="http://schemas.microsoft.com/office/powerpoint/2010/main" val="3499036315"/>
+                <p14:modId xmlns:p14="http://schemas.microsoft.com/office/powerpoint/2010/main" val="2062035975"/>
               </p:ext>
             </p:extLst>
           </p:nvPr>
@@ -22842,7 +22842,18 @@
                           <a:ea typeface="+mj-ea"/>
                           <a:cs typeface="+mn-cs"/>
                         </a:rPr>
-                        <a:t> X</a:t>
+                        <a:t> </a:t>
+                      </a:r>
+                      <a:r>
+                        <a:rPr lang="en-US" altLang="ko-KR" sz="1100" kern="1200" dirty="0" smtClean="0">
+                          <a:solidFill>
+                            <a:schemeClr val="tx1"/>
+                          </a:solidFill>
+                          <a:latin typeface="+mj-lt"/>
+                          <a:ea typeface="+mj-ea"/>
+                          <a:cs typeface="+mn-cs"/>
+                        </a:rPr>
+                        <a:t>O</a:t>
                       </a:r>
                       <a:endParaRPr lang="ko-KR" altLang="ko-KR" sz="1100" kern="1200" dirty="0" smtClean="0">
                         <a:solidFill>
@@ -22922,6 +22933,143 @@
                         <a:tabLst/>
                         <a:defRPr/>
                       </a:pPr>
+                      <a:r>
+                        <a:rPr lang="ko-KR" altLang="en-US" sz="1100" kern="1200" dirty="0" smtClean="0">
+                          <a:solidFill>
+                            <a:schemeClr val="tx1"/>
+                          </a:solidFill>
+                          <a:latin typeface="+mn-lt"/>
+                          <a:ea typeface="+mn-ea"/>
+                          <a:cs typeface="+mn-cs"/>
+                        </a:rPr>
+                        <a:t>게시판</a:t>
+                      </a:r>
+                      <a:r>
+                        <a:rPr lang="en-US" altLang="ko-KR" sz="1100" kern="1200" dirty="0" smtClean="0">
+                          <a:solidFill>
+                            <a:schemeClr val="tx1"/>
+                          </a:solidFill>
+                          <a:latin typeface="+mn-lt"/>
+                          <a:ea typeface="+mn-ea"/>
+                          <a:cs typeface="+mn-cs"/>
+                        </a:rPr>
+                        <a:t>,</a:t>
+                      </a:r>
+                      <a:r>
+                        <a:rPr lang="ko-KR" altLang="en-US" sz="1100" kern="1200" dirty="0" smtClean="0">
+                          <a:solidFill>
+                            <a:schemeClr val="tx1"/>
+                          </a:solidFill>
+                          <a:latin typeface="+mn-lt"/>
+                          <a:ea typeface="+mn-ea"/>
+                          <a:cs typeface="+mn-cs"/>
+                        </a:rPr>
+                        <a:t>자료실</a:t>
+                      </a:r>
+                      <a:r>
+                        <a:rPr lang="en-US" altLang="ko-KR" sz="1100" kern="1200" dirty="0" smtClean="0">
+                          <a:solidFill>
+                            <a:schemeClr val="tx1"/>
+                          </a:solidFill>
+                          <a:latin typeface="+mn-lt"/>
+                          <a:ea typeface="+mn-ea"/>
+                          <a:cs typeface="+mn-cs"/>
+                        </a:rPr>
+                        <a:t>,</a:t>
+                      </a:r>
+                      <a:r>
+                        <a:rPr lang="ko-KR" altLang="en-US" sz="1100" kern="1200" dirty="0" err="1" smtClean="0">
+                          <a:solidFill>
+                            <a:schemeClr val="tx1"/>
+                          </a:solidFill>
+                          <a:latin typeface="+mn-lt"/>
+                          <a:ea typeface="+mn-ea"/>
+                          <a:cs typeface="+mn-cs"/>
+                        </a:rPr>
+                        <a:t>웹메일</a:t>
+                      </a:r>
+                      <a:r>
+                        <a:rPr lang="ko-KR" altLang="en-US" sz="1100" kern="1200" dirty="0" smtClean="0">
+                          <a:solidFill>
+                            <a:schemeClr val="tx1"/>
+                          </a:solidFill>
+                          <a:latin typeface="+mn-lt"/>
+                          <a:ea typeface="+mn-ea"/>
+                          <a:cs typeface="+mn-cs"/>
+                        </a:rPr>
+                        <a:t> 미사용</a:t>
+                      </a:r>
+                      <a:endParaRPr lang="en-US" altLang="ko-KR" sz="1100" kern="1200" dirty="0" smtClean="0">
+                        <a:solidFill>
+                          <a:schemeClr val="tx1"/>
+                        </a:solidFill>
+                        <a:latin typeface="+mn-lt"/>
+                        <a:ea typeface="+mn-ea"/>
+                        <a:cs typeface="+mn-cs"/>
+                      </a:endParaRPr>
+                    </a:p>
+                    <a:p>
+                      <a:pPr marL="0" marR="0" lvl="0" indent="0" algn="l" defTabSz="914400" rtl="0" eaLnBrk="1" fontAlgn="auto" latinLnBrk="1" hangingPunct="1">
+                        <a:lnSpc>
+                          <a:spcPct val="100000"/>
+                        </a:lnSpc>
+                        <a:spcBef>
+                          <a:spcPts val="0"/>
+                        </a:spcBef>
+                        <a:spcAft>
+                          <a:spcPts val="0"/>
+                        </a:spcAft>
+                        <a:buClrTx/>
+                        <a:buSzTx/>
+                        <a:buFontTx/>
+                        <a:buNone/>
+                        <a:tabLst/>
+                        <a:defRPr/>
+                      </a:pPr>
+                      <a:r>
+                        <a:rPr lang="ko-KR" altLang="en-US" sz="1100" kern="1200" dirty="0" err="1" smtClean="0">
+                          <a:solidFill>
+                            <a:schemeClr val="tx1"/>
+                          </a:solidFill>
+                          <a:latin typeface="+mn-lt"/>
+                          <a:ea typeface="+mn-ea"/>
+                          <a:cs typeface="+mn-cs"/>
+                        </a:rPr>
+                        <a:t>검색창에</a:t>
+                      </a:r>
+                      <a:r>
+                        <a:rPr lang="ko-KR" altLang="en-US" sz="1100" kern="1200" baseline="0" dirty="0" smtClean="0">
+                          <a:solidFill>
+                            <a:schemeClr val="tx1"/>
+                          </a:solidFill>
+                          <a:latin typeface="+mn-lt"/>
+                          <a:ea typeface="+mn-ea"/>
+                          <a:cs typeface="+mn-cs"/>
+                        </a:rPr>
+                        <a:t> </a:t>
+                      </a:r>
+                      <a:r>
+                        <a:rPr lang="en-US" altLang="ko-KR" sz="1100" kern="1200" baseline="0" dirty="0" smtClean="0">
+                          <a:solidFill>
+                            <a:schemeClr val="tx1"/>
+                          </a:solidFill>
+                          <a:latin typeface="+mn-lt"/>
+                          <a:ea typeface="+mn-ea"/>
+                          <a:cs typeface="+mn-cs"/>
+                        </a:rPr>
+                        <a:t>&lt; &gt; ( ) # &amp; </a:t>
+                      </a:r>
+                      <a:r>
+                        <a:rPr lang="ko-KR" altLang="en-US" sz="1100" kern="1200" baseline="0" smtClean="0">
+                          <a:solidFill>
+                            <a:schemeClr val="tx1"/>
+                          </a:solidFill>
+                          <a:latin typeface="+mn-lt"/>
+                          <a:ea typeface="+mn-ea"/>
+                          <a:cs typeface="+mn-cs"/>
+                        </a:rPr>
+                        <a:t>입력불가처리</a:t>
+                      </a:r>
                       <a:endParaRPr lang="en-US" altLang="ko-KR" sz="1100" kern="1200" dirty="0" smtClean="0">
                         <a:solidFill>
                           <a:schemeClr val="tx1"/>

</xml_diff>

<commit_message>
timer expired auto logout : 1 hour 30 min
</commit_message>
<xml_diff>
--- a/documents/자재관리시스템_보안점검 결과서.pptx
+++ b/documents/자재관리시스템_보안점검 결과서.pptx
@@ -6209,7 +6209,7 @@
           <p:nvPr>
             <p:extLst>
               <p:ext uri="{D42A27DB-BD31-4B8C-83A1-F6EECF244321}">
-                <p14:modId xmlns:p14="http://schemas.microsoft.com/office/powerpoint/2010/main" val="1345009227"/>
+                <p14:modId xmlns:p14="http://schemas.microsoft.com/office/powerpoint/2010/main" val="1776064603"/>
               </p:ext>
             </p:extLst>
           </p:nvPr>
@@ -8094,7 +8094,7 @@
                           <a:latin typeface="Arial" pitchFamily="34" charset="0"/>
                           <a:ea typeface="돋움" pitchFamily="50" charset="-127"/>
                         </a:rPr>
-                        <a:t>X</a:t>
+                        <a:t>O</a:t>
                       </a:r>
                       <a:endParaRPr kumimoji="0" lang="ko-KR" altLang="en-US" sz="1100" b="0" i="0" u="none" strike="noStrike" cap="none" normalizeH="0" baseline="0" dirty="0" smtClean="0">
                         <a:ln>
@@ -22455,18 +22455,7 @@
                           <a:ea typeface="+mj-ea"/>
                           <a:cs typeface="+mn-cs"/>
                         </a:rPr>
-                        <a:t> </a:t>
-                      </a:r>
-                      <a:r>
-                        <a:rPr lang="en-US" altLang="ko-KR" sz="1100" kern="1200" dirty="0" smtClean="0">
-                          <a:solidFill>
-                            <a:schemeClr val="tx1"/>
-                          </a:solidFill>
-                          <a:latin typeface="+mj-lt"/>
-                          <a:ea typeface="+mj-ea"/>
-                          <a:cs typeface="+mn-cs"/>
-                        </a:rPr>
-                        <a:t>N/A</a:t>
+                        <a:t> N/A</a:t>
                       </a:r>
                       <a:endParaRPr lang="ko-KR" altLang="ko-KR" sz="1100" kern="1200" dirty="0" smtClean="0">
                         <a:solidFill>
@@ -22621,10 +22610,10 @@
                           <a:ea typeface="+mn-ea"/>
                           <a:cs typeface="+mn-cs"/>
                         </a:rPr>
-                        <a:t> </a:t>
-                      </a:r>
-                      <a:r>
-                        <a:rPr lang="ko-KR" altLang="en-US" sz="1100" kern="1200" dirty="0" smtClean="0">
+                        <a:t> 미사용</a:t>
+                      </a:r>
+                      <a:r>
+                        <a:rPr lang="en-US" altLang="ko-KR" sz="1100" kern="1200" dirty="0" smtClean="0">
                           <a:solidFill>
                             <a:schemeClr val="tx1"/>
                           </a:solidFill>
@@ -22632,27 +22621,8 @@
                           <a:ea typeface="+mn-ea"/>
                           <a:cs typeface="+mn-cs"/>
                         </a:rPr>
-                        <a:t>미사용</a:t>
-                      </a:r>
-                      <a:r>
-                        <a:rPr lang="en-US" altLang="ko-KR" sz="1100" kern="1200" dirty="0" smtClean="0">
-                          <a:solidFill>
-                            <a:schemeClr val="tx1"/>
-                          </a:solidFill>
-                          <a:latin typeface="+mn-lt"/>
-                          <a:ea typeface="+mn-ea"/>
-                          <a:cs typeface="+mn-cs"/>
-                        </a:rPr>
                         <a:t>,</a:t>
                       </a:r>
-                      <a:endParaRPr lang="en-US" altLang="ko-KR" sz="1100" kern="1200" dirty="0" smtClean="0">
-                        <a:solidFill>
-                          <a:schemeClr val="tx1"/>
-                        </a:solidFill>
-                        <a:latin typeface="+mn-lt"/>
-                        <a:ea typeface="+mn-ea"/>
-                        <a:cs typeface="+mn-cs"/>
-                      </a:endParaRPr>
                     </a:p>
                     <a:p>
                       <a:pPr marL="0" marR="0" lvl="0" indent="0" algn="l" defTabSz="914400" rtl="0" eaLnBrk="1" fontAlgn="auto" latinLnBrk="1" hangingPunct="1">
@@ -23221,14 +23191,6 @@
                         </a:rPr>
                         <a:t>)</a:t>
                       </a:r>
-                      <a:endParaRPr lang="en-US" altLang="ko-KR" sz="1100" kern="1200" dirty="0" smtClean="0">
-                        <a:solidFill>
-                          <a:schemeClr val="tx1"/>
-                        </a:solidFill>
-                        <a:latin typeface="+mn-lt"/>
-                        <a:ea typeface="+mn-ea"/>
-                        <a:cs typeface="+mn-cs"/>
-                      </a:endParaRPr>
                     </a:p>
                   </a:txBody>
                   <a:tcPr marL="91439" marR="91439" marT="45725" marB="45725" anchor="ctr" horzOverflow="overflow">
@@ -29633,14 +29595,6 @@
                         </a:rPr>
                         <a:t>관리자용 별도 인터페이스 없음</a:t>
                       </a:r>
-                      <a:endParaRPr lang="ko-KR" altLang="en-US" sz="1100" kern="1200" dirty="0" smtClean="0">
-                        <a:solidFill>
-                          <a:schemeClr val="tx1"/>
-                        </a:solidFill>
-                        <a:latin typeface="+mj-lt"/>
-                        <a:ea typeface="+mj-ea"/>
-                        <a:cs typeface="+mn-cs"/>
-                      </a:endParaRPr>
                     </a:p>
                   </a:txBody>
                   <a:tcPr marL="91439" marR="91439" marT="45721" marB="45721" anchor="ctr" horzOverflow="overflow">

</xml_diff>

<commit_message>
add some blocking keyword for sql injection
</commit_message>
<xml_diff>
--- a/documents/자재관리시스템_보안점검 결과서.pptx
+++ b/documents/자재관리시스템_보안점검 결과서.pptx
@@ -247,7 +247,7 @@
               <a:pPr>
                 <a:defRPr/>
               </a:pPr>
-              <a:t>2017-03-26</a:t>
+              <a:t>2017-03-27</a:t>
             </a:fld>
             <a:endParaRPr lang="ko-KR" altLang="en-US"/>
           </a:p>
@@ -6209,7 +6209,7 @@
           <p:nvPr>
             <p:extLst>
               <p:ext uri="{D42A27DB-BD31-4B8C-83A1-F6EECF244321}">
-                <p14:modId xmlns:p14="http://schemas.microsoft.com/office/powerpoint/2010/main" val="1776064603"/>
+                <p14:modId xmlns:p14="http://schemas.microsoft.com/office/powerpoint/2010/main" val="2512126044"/>
               </p:ext>
             </p:extLst>
           </p:nvPr>
@@ -8977,7 +8977,7 @@
                         <a:tabLst/>
                       </a:pPr>
                       <a:r>
-                        <a:rPr kumimoji="0" lang="en-US" altLang="ko-KR" sz="1100" b="0" i="0" u="none" strike="noStrike" cap="none" normalizeH="0" baseline="0" dirty="0" smtClean="0">
+                        <a:rPr kumimoji="0" lang="en-US" altLang="ko-KR" sz="1100" b="0" i="0" u="none" strike="noStrike" kern="1200" cap="none" normalizeH="0" baseline="0" dirty="0" smtClean="0">
                           <a:ln>
                             <a:noFill/>
                           </a:ln>
@@ -8987,10 +8987,11 @@
                           <a:effectLst/>
                           <a:latin typeface="Arial" pitchFamily="34" charset="0"/>
                           <a:ea typeface="돋움" pitchFamily="50" charset="-127"/>
+                          <a:cs typeface="+mn-cs"/>
                         </a:rPr>
                         <a:t>O</a:t>
                       </a:r>
-                      <a:endParaRPr kumimoji="0" lang="ko-KR" altLang="en-US" sz="1100" b="0" i="0" u="none" strike="noStrike" cap="none" normalizeH="0" baseline="0" dirty="0" smtClean="0">
+                      <a:endParaRPr kumimoji="0" lang="ko-KR" altLang="en-US" sz="1100" b="0" i="0" u="none" strike="noStrike" kern="1200" cap="none" normalizeH="0" baseline="0" dirty="0" smtClean="0">
                         <a:ln>
                           <a:noFill/>
                         </a:ln>
@@ -9000,6 +9001,7 @@
                         <a:effectLst/>
                         <a:latin typeface="Arial" pitchFamily="34" charset="0"/>
                         <a:ea typeface="돋움" pitchFamily="50" charset="-127"/>
+                        <a:cs typeface="+mn-cs"/>
                       </a:endParaRPr>
                     </a:p>
                   </a:txBody>
@@ -9164,7 +9166,7 @@
                         <a:tabLst/>
                       </a:pPr>
                       <a:r>
-                        <a:rPr kumimoji="0" lang="ko-KR" altLang="en-US" sz="1100" b="0" i="0" u="none" strike="noStrike" cap="none" normalizeH="0" baseline="0" smtClean="0">
+                        <a:rPr kumimoji="0" lang="ko-KR" altLang="en-US" sz="1100" b="0" i="0" u="none" strike="noStrike" cap="none" normalizeH="0" baseline="0" dirty="0" smtClean="0">
                           <a:ln>
                             <a:noFill/>
                           </a:ln>
@@ -9177,7 +9179,7 @@
                         </a:rPr>
                         <a:t>패스워드 조합 통제 기능</a:t>
                       </a:r>
-                      <a:endParaRPr kumimoji="0" lang="en-US" altLang="ko-KR" sz="1100" b="0" i="0" u="none" strike="noStrike" cap="none" normalizeH="0" baseline="0" smtClean="0">
+                      <a:endParaRPr kumimoji="0" lang="en-US" altLang="ko-KR" sz="1100" b="0" i="0" u="none" strike="noStrike" cap="none" normalizeH="0" baseline="0" dirty="0" smtClean="0">
                         <a:ln>
                           <a:noFill/>
                         </a:ln>
@@ -9624,7 +9626,7 @@
                         <a:tabLst/>
                       </a:pPr>
                       <a:r>
-                        <a:rPr kumimoji="0" lang="en-US" altLang="ko-KR" sz="1100" b="0" i="0" u="none" strike="noStrike" cap="none" normalizeH="0" baseline="0" dirty="0" smtClean="0">
+                        <a:rPr kumimoji="0" lang="ko-KR" altLang="en-US" sz="1100" b="0" i="0" u="none" strike="noStrike" kern="1200" cap="none" normalizeH="0" baseline="0" dirty="0" smtClean="0">
                           <a:ln>
                             <a:noFill/>
                           </a:ln>
@@ -9634,9 +9636,22 @@
                           <a:effectLst/>
                           <a:latin typeface="Arial" pitchFamily="34" charset="0"/>
                           <a:ea typeface="돋움" pitchFamily="50" charset="-127"/>
-                        </a:rPr>
-                        <a:t>O</a:t>
-                      </a:r>
+                          <a:cs typeface="+mn-cs"/>
+                        </a:rPr>
+                        <a:t>△</a:t>
+                      </a:r>
+                      <a:endParaRPr kumimoji="0" lang="en-US" altLang="ko-KR" sz="1100" b="0" i="0" u="none" strike="noStrike" kern="1200" cap="none" normalizeH="0" baseline="0" dirty="0" smtClean="0">
+                        <a:ln>
+                          <a:noFill/>
+                        </a:ln>
+                        <a:solidFill>
+                          <a:schemeClr val="tx1"/>
+                        </a:solidFill>
+                        <a:effectLst/>
+                        <a:latin typeface="Arial" pitchFamily="34" charset="0"/>
+                        <a:ea typeface="돋움" pitchFamily="50" charset="-127"/>
+                        <a:cs typeface="+mn-cs"/>
+                      </a:endParaRPr>
                     </a:p>
                     <a:p>
                       <a:pPr marL="0" marR="0" lvl="0" indent="0" algn="ctr" defTabSz="914400" rtl="0" eaLnBrk="1" fontAlgn="base" latinLnBrk="1" hangingPunct="1">
@@ -9656,7 +9671,7 @@
                         <a:tabLst/>
                       </a:pPr>
                       <a:r>
-                        <a:rPr kumimoji="0" lang="en-US" altLang="ko-KR" sz="1100" b="0" i="0" u="none" strike="noStrike" cap="none" normalizeH="0" baseline="0" dirty="0" smtClean="0">
+                        <a:rPr kumimoji="0" lang="en-US" altLang="ko-KR" sz="1100" b="0" i="0" u="none" strike="noStrike" kern="1200" cap="none" normalizeH="0" baseline="0" dirty="0" smtClean="0">
                           <a:ln>
                             <a:noFill/>
                           </a:ln>
@@ -9666,11 +9681,12 @@
                           <a:effectLst/>
                           <a:latin typeface="Arial" pitchFamily="34" charset="0"/>
                           <a:ea typeface="돋움" pitchFamily="50" charset="-127"/>
+                          <a:cs typeface="+mn-cs"/>
                         </a:rPr>
                         <a:t>1,3 </a:t>
                       </a:r>
                       <a:r>
-                        <a:rPr kumimoji="0" lang="ko-KR" altLang="en-US" sz="1100" b="0" i="0" u="none" strike="noStrike" cap="none" normalizeH="0" baseline="0" dirty="0" smtClean="0">
+                        <a:rPr kumimoji="0" lang="ko-KR" altLang="en-US" sz="1100" b="0" i="0" u="none" strike="noStrike" kern="1200" cap="none" normalizeH="0" baseline="0" dirty="0" smtClean="0">
                           <a:ln>
                             <a:noFill/>
                           </a:ln>
@@ -9680,6 +9696,7 @@
                           <a:effectLst/>
                           <a:latin typeface="Arial" pitchFamily="34" charset="0"/>
                           <a:ea typeface="돋움" pitchFamily="50" charset="-127"/>
+                          <a:cs typeface="+mn-cs"/>
                         </a:rPr>
                         <a:t>적용</a:t>
                       </a:r>
@@ -21313,7 +21330,7 @@
           <p:nvPr>
             <p:extLst>
               <p:ext uri="{D42A27DB-BD31-4B8C-83A1-F6EECF244321}">
-                <p14:modId xmlns:p14="http://schemas.microsoft.com/office/powerpoint/2010/main" val="885111318"/>
+                <p14:modId xmlns:p14="http://schemas.microsoft.com/office/powerpoint/2010/main" val="2394733901"/>
               </p:ext>
             </p:extLst>
           </p:nvPr>
@@ -23678,15 +23695,31 @@
                     <a:p>
                       <a:pPr algn="ctr"/>
                       <a:r>
-                        <a:rPr lang="en-US" altLang="ko-KR" sz="1100" dirty="0" smtClean="0">
-                          <a:latin typeface="+mj-lt"/>
-                          <a:ea typeface="+mj-ea"/>
-                        </a:rPr>
-                        <a:t>X</a:t>
-                      </a:r>
-                      <a:endParaRPr lang="ko-KR" altLang="en-US" sz="1100" dirty="0">
-                        <a:latin typeface="+mj-lt"/>
-                        <a:ea typeface="+mj-ea"/>
+                        <a:rPr kumimoji="0" lang="ko-KR" altLang="en-US" sz="1100" b="0" i="0" u="none" strike="noStrike" kern="1200" cap="none" normalizeH="0" baseline="0" dirty="0" smtClean="0">
+                          <a:ln>
+                            <a:noFill/>
+                          </a:ln>
+                          <a:solidFill>
+                            <a:schemeClr val="tx1"/>
+                          </a:solidFill>
+                          <a:effectLst/>
+                          <a:latin typeface="Arial" pitchFamily="34" charset="0"/>
+                          <a:ea typeface="돋움" pitchFamily="50" charset="-127"/>
+                          <a:cs typeface="+mn-cs"/>
+                        </a:rPr>
+                        <a:t>△</a:t>
+                      </a:r>
+                      <a:endParaRPr kumimoji="0" lang="ko-KR" altLang="en-US" sz="1100" b="0" i="0" u="none" strike="noStrike" kern="1200" cap="none" normalizeH="0" baseline="0" dirty="0">
+                        <a:ln>
+                          <a:noFill/>
+                        </a:ln>
+                        <a:solidFill>
+                          <a:schemeClr val="tx1"/>
+                        </a:solidFill>
+                        <a:effectLst/>
+                        <a:latin typeface="Arial" pitchFamily="34" charset="0"/>
+                        <a:ea typeface="돋움" pitchFamily="50" charset="-127"/>
+                        <a:cs typeface="+mn-cs"/>
                       </a:endParaRPr>
                     </a:p>
                   </a:txBody>
@@ -23741,6 +23774,28 @@
                     <a:bodyPr/>
                     <a:lstStyle/>
                     <a:p>
+                      <a:r>
+                        <a:rPr lang="ko-KR" altLang="en-US" sz="1100" kern="1200" dirty="0" err="1" smtClean="0">
+                          <a:solidFill>
+                            <a:schemeClr val="tx1"/>
+                          </a:solidFill>
+                          <a:latin typeface="+mn-lt"/>
+                          <a:ea typeface="+mn-ea"/>
+                          <a:cs typeface="+mn-cs"/>
+                        </a:rPr>
+                        <a:t>검색창에</a:t>
+                      </a:r>
+                      <a:r>
+                        <a:rPr lang="ko-KR" altLang="en-US" sz="1100" kern="1200" smtClean="0">
+                          <a:solidFill>
+                            <a:schemeClr val="tx1"/>
+                          </a:solidFill>
+                          <a:latin typeface="+mn-lt"/>
+                          <a:ea typeface="+mn-ea"/>
+                          <a:cs typeface="+mn-cs"/>
+                        </a:rPr>
+                        <a:t> 입력불가처리</a:t>
+                      </a:r>
                       <a:endParaRPr lang="ko-KR" altLang="en-US" sz="1100" dirty="0">
                         <a:latin typeface="+mj-lt"/>
                         <a:ea typeface="+mj-ea"/>

</xml_diff>